<commit_message>
changed text of explanantion image and paper design
</commit_message>
<xml_diff>
--- a/imageforbootstrap.pptx
+++ b/imageforbootstrap.pptx
@@ -7,7 +7,7 @@
   <p:sldIdLst>
     <p:sldId id="256" r:id="rId2"/>
   </p:sldIdLst>
-  <p:sldSz cx="9144000" cy="6858000" type="screen4x3"/>
+  <p:sldSz cx="6858000" cy="9906000" type="A4"/>
   <p:notesSz cx="6858000" cy="9144000"/>
   <p:defaultTextStyle>
     <a:defPPr>
@@ -136,8 +136,8 @@
         </p:nvSpPr>
         <p:spPr>
           <a:xfrm>
-            <a:off x="685800" y="2130425"/>
-            <a:ext cx="7772400" cy="1470025"/>
+            <a:off x="514350" y="3077282"/>
+            <a:ext cx="5829300" cy="2123369"/>
           </a:xfrm>
         </p:spPr>
         <p:txBody>
@@ -164,8 +164,8 @@
         </p:nvSpPr>
         <p:spPr>
           <a:xfrm>
-            <a:off x="1371600" y="3886200"/>
-            <a:ext cx="6400800" cy="1752600"/>
+            <a:off x="1028700" y="5613400"/>
+            <a:ext cx="4800600" cy="2531533"/>
           </a:xfrm>
         </p:spPr>
         <p:txBody>
@@ -288,7 +288,7 @@
           <a:p>
             <a:fld id="{756BDA85-A8FC-4F02-9215-A4907950B4A9}" type="datetimeFigureOut">
               <a:rPr lang="en-GB" smtClean="0"/>
-              <a:t>14/03/2017</a:t>
+              <a:t>16/03/2017</a:t>
             </a:fld>
             <a:endParaRPr lang="en-GB"/>
           </a:p>
@@ -458,7 +458,7 @@
           <a:p>
             <a:fld id="{756BDA85-A8FC-4F02-9215-A4907950B4A9}" type="datetimeFigureOut">
               <a:rPr lang="en-GB" smtClean="0"/>
-              <a:t>14/03/2017</a:t>
+              <a:t>16/03/2017</a:t>
             </a:fld>
             <a:endParaRPr lang="en-GB"/>
           </a:p>
@@ -548,8 +548,8 @@
         </p:nvSpPr>
         <p:spPr>
           <a:xfrm>
-            <a:off x="6629400" y="274638"/>
-            <a:ext cx="2057400" cy="5851525"/>
+            <a:off x="4972050" y="396700"/>
+            <a:ext cx="1543050" cy="8452203"/>
           </a:xfrm>
         </p:spPr>
         <p:txBody>
@@ -576,8 +576,8 @@
         </p:nvSpPr>
         <p:spPr>
           <a:xfrm>
-            <a:off x="457200" y="274638"/>
-            <a:ext cx="6019800" cy="5851525"/>
+            <a:off x="342900" y="396700"/>
+            <a:ext cx="4514850" cy="8452203"/>
           </a:xfrm>
         </p:spPr>
         <p:txBody>
@@ -638,7 +638,7 @@
           <a:p>
             <a:fld id="{756BDA85-A8FC-4F02-9215-A4907950B4A9}" type="datetimeFigureOut">
               <a:rPr lang="en-GB" smtClean="0"/>
-              <a:t>14/03/2017</a:t>
+              <a:t>16/03/2017</a:t>
             </a:fld>
             <a:endParaRPr lang="en-GB"/>
           </a:p>
@@ -808,7 +808,7 @@
           <a:p>
             <a:fld id="{756BDA85-A8FC-4F02-9215-A4907950B4A9}" type="datetimeFigureOut">
               <a:rPr lang="en-GB" smtClean="0"/>
-              <a:t>14/03/2017</a:t>
+              <a:t>16/03/2017</a:t>
             </a:fld>
             <a:endParaRPr lang="en-GB"/>
           </a:p>
@@ -898,8 +898,8 @@
         </p:nvSpPr>
         <p:spPr>
           <a:xfrm>
-            <a:off x="722313" y="4406900"/>
-            <a:ext cx="7772400" cy="1362075"/>
+            <a:off x="541735" y="6365523"/>
+            <a:ext cx="5829300" cy="1967442"/>
           </a:xfrm>
         </p:spPr>
         <p:txBody>
@@ -930,8 +930,8 @@
         </p:nvSpPr>
         <p:spPr>
           <a:xfrm>
-            <a:off x="722313" y="2906713"/>
-            <a:ext cx="7772400" cy="1500187"/>
+            <a:off x="541735" y="4198586"/>
+            <a:ext cx="5829300" cy="2166937"/>
           </a:xfrm>
         </p:spPr>
         <p:txBody>
@@ -1054,7 +1054,7 @@
           <a:p>
             <a:fld id="{756BDA85-A8FC-4F02-9215-A4907950B4A9}" type="datetimeFigureOut">
               <a:rPr lang="en-GB" smtClean="0"/>
-              <a:t>14/03/2017</a:t>
+              <a:t>16/03/2017</a:t>
             </a:fld>
             <a:endParaRPr lang="en-GB"/>
           </a:p>
@@ -1167,8 +1167,8 @@
         </p:nvSpPr>
         <p:spPr>
           <a:xfrm>
-            <a:off x="457200" y="1600200"/>
-            <a:ext cx="4038600" cy="4525963"/>
+            <a:off x="342900" y="2311401"/>
+            <a:ext cx="3028950" cy="6537502"/>
           </a:xfrm>
         </p:spPr>
         <p:txBody>
@@ -1252,8 +1252,8 @@
         </p:nvSpPr>
         <p:spPr>
           <a:xfrm>
-            <a:off x="4648200" y="1600200"/>
-            <a:ext cx="4038600" cy="4525963"/>
+            <a:off x="3486150" y="2311401"/>
+            <a:ext cx="3028950" cy="6537502"/>
           </a:xfrm>
         </p:spPr>
         <p:txBody>
@@ -1342,7 +1342,7 @@
           <a:p>
             <a:fld id="{756BDA85-A8FC-4F02-9215-A4907950B4A9}" type="datetimeFigureOut">
               <a:rPr lang="en-GB" smtClean="0"/>
-              <a:t>14/03/2017</a:t>
+              <a:t>16/03/2017</a:t>
             </a:fld>
             <a:endParaRPr lang="en-GB"/>
           </a:p>
@@ -1459,8 +1459,8 @@
         </p:nvSpPr>
         <p:spPr>
           <a:xfrm>
-            <a:off x="457200" y="1535113"/>
-            <a:ext cx="4040188" cy="639762"/>
+            <a:off x="342900" y="2217385"/>
+            <a:ext cx="3030141" cy="924101"/>
           </a:xfrm>
         </p:spPr>
         <p:txBody>
@@ -1524,8 +1524,8 @@
         </p:nvSpPr>
         <p:spPr>
           <a:xfrm>
-            <a:off x="457200" y="2174875"/>
-            <a:ext cx="4040188" cy="3951288"/>
+            <a:off x="342900" y="3141486"/>
+            <a:ext cx="3030141" cy="5707416"/>
           </a:xfrm>
         </p:spPr>
         <p:txBody>
@@ -1609,8 +1609,8 @@
         </p:nvSpPr>
         <p:spPr>
           <a:xfrm>
-            <a:off x="4645025" y="1535113"/>
-            <a:ext cx="4041775" cy="639762"/>
+            <a:off x="3483769" y="2217385"/>
+            <a:ext cx="3031331" cy="924101"/>
           </a:xfrm>
         </p:spPr>
         <p:txBody>
@@ -1674,8 +1674,8 @@
         </p:nvSpPr>
         <p:spPr>
           <a:xfrm>
-            <a:off x="4645025" y="2174875"/>
-            <a:ext cx="4041775" cy="3951288"/>
+            <a:off x="3483769" y="3141486"/>
+            <a:ext cx="3031331" cy="5707416"/>
           </a:xfrm>
         </p:spPr>
         <p:txBody>
@@ -1764,7 +1764,7 @@
           <a:p>
             <a:fld id="{756BDA85-A8FC-4F02-9215-A4907950B4A9}" type="datetimeFigureOut">
               <a:rPr lang="en-GB" smtClean="0"/>
-              <a:t>14/03/2017</a:t>
+              <a:t>16/03/2017</a:t>
             </a:fld>
             <a:endParaRPr lang="en-GB"/>
           </a:p>
@@ -1882,7 +1882,7 @@
           <a:p>
             <a:fld id="{756BDA85-A8FC-4F02-9215-A4907950B4A9}" type="datetimeFigureOut">
               <a:rPr lang="en-GB" smtClean="0"/>
-              <a:t>14/03/2017</a:t>
+              <a:t>16/03/2017</a:t>
             </a:fld>
             <a:endParaRPr lang="en-GB"/>
           </a:p>
@@ -1977,7 +1977,7 @@
           <a:p>
             <a:fld id="{756BDA85-A8FC-4F02-9215-A4907950B4A9}" type="datetimeFigureOut">
               <a:rPr lang="en-GB" smtClean="0"/>
-              <a:t>14/03/2017</a:t>
+              <a:t>16/03/2017</a:t>
             </a:fld>
             <a:endParaRPr lang="en-GB"/>
           </a:p>
@@ -2067,8 +2067,8 @@
         </p:nvSpPr>
         <p:spPr>
           <a:xfrm>
-            <a:off x="457200" y="273050"/>
-            <a:ext cx="3008313" cy="1162050"/>
+            <a:off x="342900" y="394405"/>
+            <a:ext cx="2256235" cy="1678517"/>
           </a:xfrm>
         </p:spPr>
         <p:txBody>
@@ -2099,8 +2099,8 @@
         </p:nvSpPr>
         <p:spPr>
           <a:xfrm>
-            <a:off x="3575050" y="273050"/>
-            <a:ext cx="5111750" cy="5853113"/>
+            <a:off x="2681287" y="394406"/>
+            <a:ext cx="3833813" cy="8454497"/>
           </a:xfrm>
         </p:spPr>
         <p:txBody>
@@ -2184,8 +2184,8 @@
         </p:nvSpPr>
         <p:spPr>
           <a:xfrm>
-            <a:off x="457200" y="1435100"/>
-            <a:ext cx="3008313" cy="4691063"/>
+            <a:off x="342900" y="2072923"/>
+            <a:ext cx="2256235" cy="6775980"/>
           </a:xfrm>
         </p:spPr>
         <p:txBody>
@@ -2254,7 +2254,7 @@
           <a:p>
             <a:fld id="{756BDA85-A8FC-4F02-9215-A4907950B4A9}" type="datetimeFigureOut">
               <a:rPr lang="en-GB" smtClean="0"/>
-              <a:t>14/03/2017</a:t>
+              <a:t>16/03/2017</a:t>
             </a:fld>
             <a:endParaRPr lang="en-GB"/>
           </a:p>
@@ -2344,8 +2344,8 @@
         </p:nvSpPr>
         <p:spPr>
           <a:xfrm>
-            <a:off x="1792288" y="4800600"/>
-            <a:ext cx="5486400" cy="566738"/>
+            <a:off x="1344216" y="6934200"/>
+            <a:ext cx="4114800" cy="818622"/>
           </a:xfrm>
         </p:spPr>
         <p:txBody>
@@ -2376,8 +2376,8 @@
         </p:nvSpPr>
         <p:spPr>
           <a:xfrm>
-            <a:off x="1792288" y="612775"/>
-            <a:ext cx="5486400" cy="4114800"/>
+            <a:off x="1344216" y="885119"/>
+            <a:ext cx="4114800" cy="5943600"/>
           </a:xfrm>
         </p:spPr>
         <p:txBody>
@@ -2437,8 +2437,8 @@
         </p:nvSpPr>
         <p:spPr>
           <a:xfrm>
-            <a:off x="1792288" y="5367338"/>
-            <a:ext cx="5486400" cy="804862"/>
+            <a:off x="1344216" y="7752822"/>
+            <a:ext cx="4114800" cy="1162578"/>
           </a:xfrm>
         </p:spPr>
         <p:txBody>
@@ -2507,7 +2507,7 @@
           <a:p>
             <a:fld id="{756BDA85-A8FC-4F02-9215-A4907950B4A9}" type="datetimeFigureOut">
               <a:rPr lang="en-GB" smtClean="0"/>
-              <a:t>14/03/2017</a:t>
+              <a:t>16/03/2017</a:t>
             </a:fld>
             <a:endParaRPr lang="en-GB"/>
           </a:p>
@@ -2602,8 +2602,8 @@
         </p:nvSpPr>
         <p:spPr>
           <a:xfrm>
-            <a:off x="457200" y="274638"/>
-            <a:ext cx="8229600" cy="1143000"/>
+            <a:off x="342900" y="396699"/>
+            <a:ext cx="6172200" cy="1651000"/>
           </a:xfrm>
           <a:prstGeom prst="rect">
             <a:avLst/>
@@ -2635,8 +2635,8 @@
         </p:nvSpPr>
         <p:spPr>
           <a:xfrm>
-            <a:off x="457200" y="1600200"/>
-            <a:ext cx="8229600" cy="4525963"/>
+            <a:off x="342900" y="2311401"/>
+            <a:ext cx="6172200" cy="6537502"/>
           </a:xfrm>
           <a:prstGeom prst="rect">
             <a:avLst/>
@@ -2697,8 +2697,8 @@
         </p:nvSpPr>
         <p:spPr>
           <a:xfrm>
-            <a:off x="457200" y="6356350"/>
-            <a:ext cx="2133600" cy="365125"/>
+            <a:off x="342900" y="9181395"/>
+            <a:ext cx="1600200" cy="527403"/>
           </a:xfrm>
           <a:prstGeom prst="rect">
             <a:avLst/>
@@ -2720,7 +2720,7 @@
           <a:p>
             <a:fld id="{756BDA85-A8FC-4F02-9215-A4907950B4A9}" type="datetimeFigureOut">
               <a:rPr lang="en-GB" smtClean="0"/>
-              <a:t>14/03/2017</a:t>
+              <a:t>16/03/2017</a:t>
             </a:fld>
             <a:endParaRPr lang="en-GB"/>
           </a:p>
@@ -2738,8 +2738,8 @@
         </p:nvSpPr>
         <p:spPr>
           <a:xfrm>
-            <a:off x="3124200" y="6356350"/>
-            <a:ext cx="2895600" cy="365125"/>
+            <a:off x="2343150" y="9181395"/>
+            <a:ext cx="2171700" cy="527403"/>
           </a:xfrm>
           <a:prstGeom prst="rect">
             <a:avLst/>
@@ -2775,8 +2775,8 @@
         </p:nvSpPr>
         <p:spPr>
           <a:xfrm>
-            <a:off x="6553200" y="6356350"/>
-            <a:ext cx="2133600" cy="365125"/>
+            <a:off x="4914900" y="9181395"/>
+            <a:ext cx="1600200" cy="527403"/>
           </a:xfrm>
           <a:prstGeom prst="rect">
             <a:avLst/>
@@ -3103,8 +3103,8 @@
         </p:nvSpPr>
         <p:spPr>
           <a:xfrm>
-            <a:off x="4666022" y="109310"/>
-            <a:ext cx="813792" cy="748502"/>
+            <a:off x="2954444" y="222550"/>
+            <a:ext cx="507584" cy="482817"/>
           </a:xfrm>
           <a:custGeom>
             <a:avLst/>
@@ -3180,8 +3180,8 @@
         </p:nvSpPr>
         <p:spPr>
           <a:xfrm>
-            <a:off x="3852230" y="116632"/>
-            <a:ext cx="813792" cy="748502"/>
+            <a:off x="2367238" y="222550"/>
+            <a:ext cx="507584" cy="482817"/>
           </a:xfrm>
           <a:custGeom>
             <a:avLst/>
@@ -3257,8 +3257,8 @@
         </p:nvSpPr>
         <p:spPr>
           <a:xfrm>
-            <a:off x="3010320" y="116632"/>
-            <a:ext cx="813792" cy="748502"/>
+            <a:off x="1815391" y="219171"/>
+            <a:ext cx="507584" cy="482817"/>
           </a:xfrm>
           <a:custGeom>
             <a:avLst/>
@@ -3334,8 +3334,8 @@
         </p:nvSpPr>
         <p:spPr>
           <a:xfrm>
-            <a:off x="5488973" y="109310"/>
-            <a:ext cx="813792" cy="748502"/>
+            <a:off x="3569042" y="219170"/>
+            <a:ext cx="507584" cy="482817"/>
           </a:xfrm>
           <a:custGeom>
             <a:avLst/>
@@ -3411,8 +3411,8 @@
         </p:nvSpPr>
         <p:spPr>
           <a:xfrm>
-            <a:off x="2936467" y="1779506"/>
-            <a:ext cx="457200" cy="510553"/>
+            <a:off x="2223896" y="1626895"/>
+            <a:ext cx="433513" cy="331747"/>
           </a:xfrm>
           <a:custGeom>
             <a:avLst/>
@@ -3522,8 +3522,8 @@
         </p:nvSpPr>
         <p:spPr>
           <a:xfrm>
-            <a:off x="2433542" y="1774829"/>
-            <a:ext cx="457200" cy="505994"/>
+            <a:off x="1846703" y="1620138"/>
+            <a:ext cx="433513" cy="328785"/>
           </a:xfrm>
           <a:custGeom>
             <a:avLst/>
@@ -3615,8 +3615,8 @@
         </p:nvSpPr>
         <p:spPr>
           <a:xfrm>
-            <a:off x="1902106" y="1773297"/>
-            <a:ext cx="457200" cy="507525"/>
+            <a:off x="1448126" y="1617926"/>
+            <a:ext cx="433513" cy="329780"/>
           </a:xfrm>
           <a:custGeom>
             <a:avLst/>
@@ -3708,8 +3708,8 @@
         </p:nvSpPr>
         <p:spPr>
           <a:xfrm>
-            <a:off x="3391845" y="1790460"/>
-            <a:ext cx="460385" cy="490363"/>
+            <a:off x="2565431" y="1642717"/>
+            <a:ext cx="436534" cy="318628"/>
           </a:xfrm>
           <a:custGeom>
             <a:avLst/>
@@ -3829,8 +3829,8 @@
         </p:nvSpPr>
         <p:spPr>
           <a:xfrm>
-            <a:off x="7194976" y="1445902"/>
-            <a:ext cx="914400" cy="794053"/>
+            <a:off x="5203271" y="1445386"/>
+            <a:ext cx="867026" cy="515959"/>
           </a:xfrm>
           <a:custGeom>
             <a:avLst/>
@@ -3928,8 +3928,8 @@
         </p:nvSpPr>
         <p:spPr>
           <a:xfrm>
-            <a:off x="6186864" y="1505850"/>
-            <a:ext cx="914400" cy="741427"/>
+            <a:off x="4447187" y="1531977"/>
+            <a:ext cx="867026" cy="481764"/>
           </a:xfrm>
           <a:custGeom>
             <a:avLst/>
@@ -4039,8 +4039,8 @@
         </p:nvSpPr>
         <p:spPr>
           <a:xfrm>
-            <a:off x="5178752" y="1488569"/>
-            <a:ext cx="914400" cy="758708"/>
+            <a:off x="3691103" y="1507015"/>
+            <a:ext cx="867026" cy="492993"/>
           </a:xfrm>
           <a:custGeom>
             <a:avLst/>
@@ -4150,8 +4150,8 @@
         </p:nvSpPr>
         <p:spPr>
           <a:xfrm>
-            <a:off x="8193851" y="1497268"/>
-            <a:ext cx="914400" cy="742688"/>
+            <a:off x="5952427" y="1519580"/>
+            <a:ext cx="867026" cy="482584"/>
           </a:xfrm>
           <a:custGeom>
             <a:avLst/>
@@ -4293,8 +4293,8 @@
         </p:nvSpPr>
         <p:spPr>
           <a:xfrm>
-            <a:off x="1697367" y="3350823"/>
-            <a:ext cx="282516" cy="319846"/>
+            <a:off x="1467124" y="3243024"/>
+            <a:ext cx="267879" cy="207830"/>
           </a:xfrm>
           <a:custGeom>
             <a:avLst/>
@@ -4410,8 +4410,8 @@
         </p:nvSpPr>
         <p:spPr>
           <a:xfrm>
-            <a:off x="1383016" y="3248834"/>
-            <a:ext cx="281321" cy="431070"/>
+            <a:off x="1162992" y="3170753"/>
+            <a:ext cx="266747" cy="280101"/>
           </a:xfrm>
           <a:custGeom>
             <a:avLst/>
@@ -4509,8 +4509,8 @@
         </p:nvSpPr>
         <p:spPr>
           <a:xfrm>
-            <a:off x="1081989" y="3422522"/>
-            <a:ext cx="281321" cy="257383"/>
+            <a:off x="877440" y="3283612"/>
+            <a:ext cx="266747" cy="167242"/>
           </a:xfrm>
           <a:custGeom>
             <a:avLst/>
@@ -4602,8 +4602,8 @@
         </p:nvSpPr>
         <p:spPr>
           <a:xfrm>
-            <a:off x="2010634" y="3394613"/>
-            <a:ext cx="281321" cy="285291"/>
+            <a:off x="1750805" y="3265478"/>
+            <a:ext cx="266747" cy="185376"/>
           </a:xfrm>
           <a:custGeom>
             <a:avLst/>
@@ -4695,8 +4695,8 @@
         </p:nvSpPr>
         <p:spPr>
           <a:xfrm>
-            <a:off x="4753123" y="3352602"/>
-            <a:ext cx="281321" cy="324005"/>
+            <a:off x="3701310" y="3275047"/>
+            <a:ext cx="266747" cy="210532"/>
           </a:xfrm>
           <a:custGeom>
             <a:avLst/>
@@ -4778,8 +4778,8 @@
         </p:nvSpPr>
         <p:spPr>
           <a:xfrm>
-            <a:off x="4429002" y="3514668"/>
-            <a:ext cx="281321" cy="161940"/>
+            <a:off x="3466125" y="3362218"/>
+            <a:ext cx="266747" cy="105225"/>
           </a:xfrm>
           <a:custGeom>
             <a:avLst/>
@@ -4877,8 +4877,8 @@
         </p:nvSpPr>
         <p:spPr>
           <a:xfrm>
-            <a:off x="4127975" y="3419598"/>
-            <a:ext cx="281321" cy="257010"/>
+            <a:off x="3212651" y="3299536"/>
+            <a:ext cx="266747" cy="167000"/>
           </a:xfrm>
           <a:custGeom>
             <a:avLst/>
@@ -4970,8 +4970,8 @@
         </p:nvSpPr>
         <p:spPr>
           <a:xfrm>
-            <a:off x="5068569" y="3404515"/>
-            <a:ext cx="230192" cy="275390"/>
+            <a:off x="3975763" y="3287593"/>
+            <a:ext cx="218266" cy="178943"/>
           </a:xfrm>
           <a:custGeom>
             <a:avLst/>
@@ -5092,14 +5092,14 @@
           <p:nvPr>
             <p:extLst>
               <p:ext uri="{D42A27DB-BD31-4B8C-83A1-F6EECF244321}">
-                <p14:modId xmlns:p14="http://schemas.microsoft.com/office/powerpoint/2010/main" val="1645464374"/>
+                <p14:modId xmlns:p14="http://schemas.microsoft.com/office/powerpoint/2010/main" val="535229696"/>
               </p:ext>
             </p:extLst>
           </p:nvPr>
         </p:nvGraphicFramePr>
         <p:xfrm>
-          <a:off x="597606" y="3831309"/>
-          <a:ext cx="2205160" cy="426720"/>
+          <a:off x="459461" y="3584848"/>
+          <a:ext cx="1940555" cy="508000"/>
         </p:xfrm>
         <a:graphic>
           <a:graphicData uri="http://schemas.openxmlformats.org/drawingml/2006/table">
@@ -5108,26 +5108,32 @@
                 <a:tableStyleId>{5940675A-B579-460E-94D1-54222C63F5DA}</a:tableStyleId>
               </a:tblPr>
               <a:tblGrid>
-                <a:gridCol w="441032"/>
-                <a:gridCol w="441032"/>
-                <a:gridCol w="441032"/>
-                <a:gridCol w="441032"/>
-                <a:gridCol w="441032"/>
+                <a:gridCol w="388111"/>
+                <a:gridCol w="388111"/>
+                <a:gridCol w="388111"/>
+                <a:gridCol w="388111"/>
+                <a:gridCol w="388111"/>
               </a:tblGrid>
-              <a:tr h="160913">
+              <a:tr h="0">
                 <a:tc>
                   <a:txBody>
                     <a:bodyPr/>
                     <a:lstStyle/>
                     <a:p>
                       <a:r>
-                        <a:rPr lang="en-GB" sz="800" b="1" dirty="0" smtClean="0"/>
+                        <a:rPr lang="en-GB" sz="800" b="1" dirty="0" smtClean="0">
+                          <a:latin typeface="Times New Roman" panose="02020603050405020304" pitchFamily="18" charset="0"/>
+                          <a:cs typeface="Times New Roman" panose="02020603050405020304" pitchFamily="18" charset="0"/>
+                        </a:rPr>
                         <a:t>Index</a:t>
                       </a:r>
-                      <a:endParaRPr lang="en-GB" sz="800" b="1" dirty="0"/>
+                      <a:endParaRPr lang="en-GB" sz="800" b="1" dirty="0">
+                        <a:latin typeface="Times New Roman" panose="02020603050405020304" pitchFamily="18" charset="0"/>
+                        <a:cs typeface="Times New Roman" panose="02020603050405020304" pitchFamily="18" charset="0"/>
+                      </a:endParaRPr>
                     </a:p>
                   </a:txBody>
-                  <a:tcPr/>
+                  <a:tcPr marL="68580" marR="68580" marT="66040" marB="66040"/>
                 </a:tc>
                 <a:tc>
                   <a:txBody>
@@ -5135,13 +5141,19 @@
                     <a:lstStyle/>
                     <a:p>
                       <a:r>
-                        <a:rPr lang="en-GB" sz="800" b="1" dirty="0" smtClean="0"/>
+                        <a:rPr lang="en-GB" sz="800" b="1" dirty="0" smtClean="0">
+                          <a:latin typeface="Times New Roman" panose="02020603050405020304" pitchFamily="18" charset="0"/>
+                          <a:cs typeface="Times New Roman" panose="02020603050405020304" pitchFamily="18" charset="0"/>
+                        </a:rPr>
                         <a:t>1</a:t>
                       </a:r>
-                      <a:endParaRPr lang="en-GB" sz="800" b="1" dirty="0"/>
+                      <a:endParaRPr lang="en-GB" sz="800" b="1" dirty="0">
+                        <a:latin typeface="Times New Roman" panose="02020603050405020304" pitchFamily="18" charset="0"/>
+                        <a:cs typeface="Times New Roman" panose="02020603050405020304" pitchFamily="18" charset="0"/>
+                      </a:endParaRPr>
                     </a:p>
                   </a:txBody>
-                  <a:tcPr/>
+                  <a:tcPr marL="68580" marR="68580" marT="66040" marB="66040"/>
                 </a:tc>
                 <a:tc>
                   <a:txBody>
@@ -5149,13 +5161,19 @@
                     <a:lstStyle/>
                     <a:p>
                       <a:r>
-                        <a:rPr lang="en-GB" sz="800" b="1" dirty="0" smtClean="0"/>
+                        <a:rPr lang="en-GB" sz="800" b="1" dirty="0" smtClean="0">
+                          <a:latin typeface="Times New Roman" panose="02020603050405020304" pitchFamily="18" charset="0"/>
+                          <a:cs typeface="Times New Roman" panose="02020603050405020304" pitchFamily="18" charset="0"/>
+                        </a:rPr>
                         <a:t>2</a:t>
                       </a:r>
-                      <a:endParaRPr lang="en-GB" sz="800" b="1" dirty="0"/>
+                      <a:endParaRPr lang="en-GB" sz="800" b="1" dirty="0">
+                        <a:latin typeface="Times New Roman" panose="02020603050405020304" pitchFamily="18" charset="0"/>
+                        <a:cs typeface="Times New Roman" panose="02020603050405020304" pitchFamily="18" charset="0"/>
+                      </a:endParaRPr>
                     </a:p>
                   </a:txBody>
-                  <a:tcPr/>
+                  <a:tcPr marL="68580" marR="68580" marT="66040" marB="66040"/>
                 </a:tc>
                 <a:tc>
                   <a:txBody>
@@ -5163,13 +5181,19 @@
                     <a:lstStyle/>
                     <a:p>
                       <a:r>
-                        <a:rPr lang="en-GB" sz="800" b="1" dirty="0" smtClean="0"/>
+                        <a:rPr lang="en-GB" sz="800" b="1" dirty="0" smtClean="0">
+                          <a:latin typeface="Times New Roman" panose="02020603050405020304" pitchFamily="18" charset="0"/>
+                          <a:cs typeface="Times New Roman" panose="02020603050405020304" pitchFamily="18" charset="0"/>
+                        </a:rPr>
                         <a:t>3</a:t>
                       </a:r>
-                      <a:endParaRPr lang="en-GB" sz="800" b="1" dirty="0"/>
+                      <a:endParaRPr lang="en-GB" sz="800" b="1" dirty="0">
+                        <a:latin typeface="Times New Roman" panose="02020603050405020304" pitchFamily="18" charset="0"/>
+                        <a:cs typeface="Times New Roman" panose="02020603050405020304" pitchFamily="18" charset="0"/>
+                      </a:endParaRPr>
                     </a:p>
                   </a:txBody>
-                  <a:tcPr/>
+                  <a:tcPr marL="68580" marR="68580" marT="66040" marB="66040"/>
                 </a:tc>
                 <a:tc>
                   <a:txBody>
@@ -5177,29 +5201,41 @@
                     <a:lstStyle/>
                     <a:p>
                       <a:r>
-                        <a:rPr lang="en-GB" sz="800" b="1" dirty="0" smtClean="0"/>
+                        <a:rPr lang="en-GB" sz="800" b="1" dirty="0" smtClean="0">
+                          <a:latin typeface="Times New Roman" panose="02020603050405020304" pitchFamily="18" charset="0"/>
+                          <a:cs typeface="Times New Roman" panose="02020603050405020304" pitchFamily="18" charset="0"/>
+                        </a:rPr>
                         <a:t>4</a:t>
                       </a:r>
-                      <a:endParaRPr lang="en-GB" sz="800" b="1" dirty="0"/>
+                      <a:endParaRPr lang="en-GB" sz="800" b="1" dirty="0">
+                        <a:latin typeface="Times New Roman" panose="02020603050405020304" pitchFamily="18" charset="0"/>
+                        <a:cs typeface="Times New Roman" panose="02020603050405020304" pitchFamily="18" charset="0"/>
+                      </a:endParaRPr>
                     </a:p>
                   </a:txBody>
-                  <a:tcPr/>
+                  <a:tcPr marL="68580" marR="68580" marT="66040" marB="66040"/>
                 </a:tc>
               </a:tr>
-              <a:tr h="199127">
+              <a:tr h="0">
                 <a:tc>
                   <a:txBody>
                     <a:bodyPr/>
                     <a:lstStyle/>
                     <a:p>
                       <a:r>
-                        <a:rPr lang="en-GB" sz="800" b="1" dirty="0" smtClean="0"/>
+                        <a:rPr lang="en-GB" sz="800" b="1" dirty="0" smtClean="0">
+                          <a:latin typeface="Times New Roman" panose="02020603050405020304" pitchFamily="18" charset="0"/>
+                          <a:cs typeface="Times New Roman" panose="02020603050405020304" pitchFamily="18" charset="0"/>
+                        </a:rPr>
                         <a:t>Mean</a:t>
                       </a:r>
-                      <a:endParaRPr lang="en-GB" sz="800" b="1" dirty="0"/>
+                      <a:endParaRPr lang="en-GB" sz="800" b="1" dirty="0">
+                        <a:latin typeface="Times New Roman" panose="02020603050405020304" pitchFamily="18" charset="0"/>
+                        <a:cs typeface="Times New Roman" panose="02020603050405020304" pitchFamily="18" charset="0"/>
+                      </a:endParaRPr>
                     </a:p>
                   </a:txBody>
-                  <a:tcPr/>
+                  <a:tcPr marL="68580" marR="68580" marT="66040" marB="66040"/>
                 </a:tc>
                 <a:tc>
                   <a:txBody>
@@ -5207,13 +5243,19 @@
                     <a:lstStyle/>
                     <a:p>
                       <a:r>
-                        <a:rPr lang="en-GB" sz="800" b="1" dirty="0" smtClean="0"/>
+                        <a:rPr lang="en-GB" sz="800" b="1" dirty="0" smtClean="0">
+                          <a:latin typeface="Times New Roman" panose="02020603050405020304" pitchFamily="18" charset="0"/>
+                          <a:cs typeface="Times New Roman" panose="02020603050405020304" pitchFamily="18" charset="0"/>
+                        </a:rPr>
                         <a:t>31.4</a:t>
                       </a:r>
-                      <a:endParaRPr lang="en-GB" sz="800" b="1" dirty="0"/>
+                      <a:endParaRPr lang="en-GB" sz="800" b="1" dirty="0">
+                        <a:latin typeface="Times New Roman" panose="02020603050405020304" pitchFamily="18" charset="0"/>
+                        <a:cs typeface="Times New Roman" panose="02020603050405020304" pitchFamily="18" charset="0"/>
+                      </a:endParaRPr>
                     </a:p>
                   </a:txBody>
-                  <a:tcPr/>
+                  <a:tcPr marL="68580" marR="68580" marT="66040" marB="66040"/>
                 </a:tc>
                 <a:tc>
                   <a:txBody>
@@ -5221,13 +5263,19 @@
                     <a:lstStyle/>
                     <a:p>
                       <a:r>
-                        <a:rPr lang="en-GB" sz="800" b="1" dirty="0" smtClean="0"/>
+                        <a:rPr lang="en-GB" sz="800" b="1" dirty="0" smtClean="0">
+                          <a:latin typeface="Times New Roman" panose="02020603050405020304" pitchFamily="18" charset="0"/>
+                          <a:cs typeface="Times New Roman" panose="02020603050405020304" pitchFamily="18" charset="0"/>
+                        </a:rPr>
                         <a:t>39.4</a:t>
                       </a:r>
-                      <a:endParaRPr lang="en-GB" sz="800" b="1" dirty="0"/>
+                      <a:endParaRPr lang="en-GB" sz="800" b="1" dirty="0">
+                        <a:latin typeface="Times New Roman" panose="02020603050405020304" pitchFamily="18" charset="0"/>
+                        <a:cs typeface="Times New Roman" panose="02020603050405020304" pitchFamily="18" charset="0"/>
+                      </a:endParaRPr>
                     </a:p>
                   </a:txBody>
-                  <a:tcPr/>
+                  <a:tcPr marL="68580" marR="68580" marT="66040" marB="66040"/>
                 </a:tc>
                 <a:tc>
                   <a:txBody>
@@ -5235,13 +5283,19 @@
                     <a:lstStyle/>
                     <a:p>
                       <a:r>
-                        <a:rPr lang="en-GB" sz="800" b="1" dirty="0" smtClean="0"/>
+                        <a:rPr lang="en-GB" sz="800" b="1" dirty="0" smtClean="0">
+                          <a:latin typeface="Times New Roman" panose="02020603050405020304" pitchFamily="18" charset="0"/>
+                          <a:cs typeface="Times New Roman" panose="02020603050405020304" pitchFamily="18" charset="0"/>
+                        </a:rPr>
                         <a:t>52.5</a:t>
                       </a:r>
-                      <a:endParaRPr lang="en-GB" sz="800" b="1" dirty="0"/>
+                      <a:endParaRPr lang="en-GB" sz="800" b="1" dirty="0">
+                        <a:latin typeface="Times New Roman" panose="02020603050405020304" pitchFamily="18" charset="0"/>
+                        <a:cs typeface="Times New Roman" panose="02020603050405020304" pitchFamily="18" charset="0"/>
+                      </a:endParaRPr>
                     </a:p>
                   </a:txBody>
-                  <a:tcPr/>
+                  <a:tcPr marL="68580" marR="68580" marT="66040" marB="66040"/>
                 </a:tc>
                 <a:tc>
                   <a:txBody>
@@ -5249,13 +5303,19 @@
                     <a:lstStyle/>
                     <a:p>
                       <a:r>
-                        <a:rPr lang="en-GB" sz="800" b="1" dirty="0" smtClean="0"/>
+                        <a:rPr lang="en-GB" sz="800" b="1" dirty="0" smtClean="0">
+                          <a:latin typeface="Times New Roman" panose="02020603050405020304" pitchFamily="18" charset="0"/>
+                          <a:cs typeface="Times New Roman" panose="02020603050405020304" pitchFamily="18" charset="0"/>
+                        </a:rPr>
                         <a:t>57</a:t>
                       </a:r>
-                      <a:endParaRPr lang="en-GB" sz="800" b="1" dirty="0"/>
+                      <a:endParaRPr lang="en-GB" sz="800" b="1" dirty="0">
+                        <a:latin typeface="Times New Roman" panose="02020603050405020304" pitchFamily="18" charset="0"/>
+                        <a:cs typeface="Times New Roman" panose="02020603050405020304" pitchFamily="18" charset="0"/>
+                      </a:endParaRPr>
                     </a:p>
                   </a:txBody>
-                  <a:tcPr/>
+                  <a:tcPr marL="68580" marR="68580" marT="66040" marB="66040"/>
                 </a:tc>
               </a:tr>
             </a:tbl>
@@ -5271,14 +5331,14 @@
           <p:nvPr>
             <p:extLst>
               <p:ext uri="{D42A27DB-BD31-4B8C-83A1-F6EECF244321}">
-                <p14:modId xmlns:p14="http://schemas.microsoft.com/office/powerpoint/2010/main" val="1879738893"/>
+                <p14:modId xmlns:p14="http://schemas.microsoft.com/office/powerpoint/2010/main" val="1088049522"/>
               </p:ext>
             </p:extLst>
           </p:nvPr>
         </p:nvGraphicFramePr>
         <p:xfrm>
-          <a:off x="3690709" y="3831309"/>
-          <a:ext cx="2205160" cy="426720"/>
+          <a:off x="2948479" y="3606963"/>
+          <a:ext cx="1979545" cy="508000"/>
         </p:xfrm>
         <a:graphic>
           <a:graphicData uri="http://schemas.openxmlformats.org/drawingml/2006/table">
@@ -5287,26 +5347,32 @@
                 <a:tableStyleId>{5940675A-B579-460E-94D1-54222C63F5DA}</a:tableStyleId>
               </a:tblPr>
               <a:tblGrid>
-                <a:gridCol w="441032"/>
-                <a:gridCol w="441032"/>
-                <a:gridCol w="441032"/>
-                <a:gridCol w="441032"/>
-                <a:gridCol w="441032"/>
+                <a:gridCol w="395909"/>
+                <a:gridCol w="395909"/>
+                <a:gridCol w="395909"/>
+                <a:gridCol w="395909"/>
+                <a:gridCol w="395909"/>
               </a:tblGrid>
-              <a:tr h="160913">
+              <a:tr h="0">
                 <a:tc>
                   <a:txBody>
                     <a:bodyPr/>
                     <a:lstStyle/>
                     <a:p>
                       <a:r>
-                        <a:rPr lang="en-GB" sz="800" b="1" dirty="0" smtClean="0"/>
+                        <a:rPr lang="en-GB" sz="800" b="1" dirty="0" smtClean="0">
+                          <a:latin typeface="Times New Roman" panose="02020603050405020304" pitchFamily="18" charset="0"/>
+                          <a:cs typeface="Times New Roman" panose="02020603050405020304" pitchFamily="18" charset="0"/>
+                        </a:rPr>
                         <a:t>Index</a:t>
                       </a:r>
-                      <a:endParaRPr lang="en-GB" sz="800" b="1" dirty="0"/>
+                      <a:endParaRPr lang="en-GB" sz="800" b="1" dirty="0">
+                        <a:latin typeface="Times New Roman" panose="02020603050405020304" pitchFamily="18" charset="0"/>
+                        <a:cs typeface="Times New Roman" panose="02020603050405020304" pitchFamily="18" charset="0"/>
+                      </a:endParaRPr>
                     </a:p>
                   </a:txBody>
-                  <a:tcPr/>
+                  <a:tcPr marL="68580" marR="68580" marT="66040" marB="66040"/>
                 </a:tc>
                 <a:tc>
                   <a:txBody>
@@ -5314,13 +5380,19 @@
                     <a:lstStyle/>
                     <a:p>
                       <a:r>
-                        <a:rPr lang="en-GB" sz="800" b="1" dirty="0" smtClean="0"/>
+                        <a:rPr lang="en-GB" sz="800" b="1" dirty="0" smtClean="0">
+                          <a:latin typeface="Times New Roman" panose="02020603050405020304" pitchFamily="18" charset="0"/>
+                          <a:cs typeface="Times New Roman" panose="02020603050405020304" pitchFamily="18" charset="0"/>
+                        </a:rPr>
                         <a:t>1</a:t>
                       </a:r>
-                      <a:endParaRPr lang="en-GB" sz="800" b="1" dirty="0"/>
+                      <a:endParaRPr lang="en-GB" sz="800" b="1" dirty="0">
+                        <a:latin typeface="Times New Roman" panose="02020603050405020304" pitchFamily="18" charset="0"/>
+                        <a:cs typeface="Times New Roman" panose="02020603050405020304" pitchFamily="18" charset="0"/>
+                      </a:endParaRPr>
                     </a:p>
                   </a:txBody>
-                  <a:tcPr/>
+                  <a:tcPr marL="68580" marR="68580" marT="66040" marB="66040"/>
                 </a:tc>
                 <a:tc>
                   <a:txBody>
@@ -5328,13 +5400,19 @@
                     <a:lstStyle/>
                     <a:p>
                       <a:r>
-                        <a:rPr lang="en-GB" sz="800" b="1" dirty="0" smtClean="0"/>
+                        <a:rPr lang="en-GB" sz="800" b="1" dirty="0" smtClean="0">
+                          <a:latin typeface="Times New Roman" panose="02020603050405020304" pitchFamily="18" charset="0"/>
+                          <a:cs typeface="Times New Roman" panose="02020603050405020304" pitchFamily="18" charset="0"/>
+                        </a:rPr>
                         <a:t>2</a:t>
                       </a:r>
-                      <a:endParaRPr lang="en-GB" sz="800" b="1" dirty="0"/>
+                      <a:endParaRPr lang="en-GB" sz="800" b="1" dirty="0">
+                        <a:latin typeface="Times New Roman" panose="02020603050405020304" pitchFamily="18" charset="0"/>
+                        <a:cs typeface="Times New Roman" panose="02020603050405020304" pitchFamily="18" charset="0"/>
+                      </a:endParaRPr>
                     </a:p>
                   </a:txBody>
-                  <a:tcPr/>
+                  <a:tcPr marL="68580" marR="68580" marT="66040" marB="66040"/>
                 </a:tc>
                 <a:tc>
                   <a:txBody>
@@ -5342,13 +5420,19 @@
                     <a:lstStyle/>
                     <a:p>
                       <a:r>
-                        <a:rPr lang="en-GB" sz="800" b="1" dirty="0" smtClean="0"/>
+                        <a:rPr lang="en-GB" sz="800" b="1" dirty="0" smtClean="0">
+                          <a:latin typeface="Times New Roman" panose="02020603050405020304" pitchFamily="18" charset="0"/>
+                          <a:cs typeface="Times New Roman" panose="02020603050405020304" pitchFamily="18" charset="0"/>
+                        </a:rPr>
                         <a:t>3</a:t>
                       </a:r>
-                      <a:endParaRPr lang="en-GB" sz="800" b="1" dirty="0"/>
+                      <a:endParaRPr lang="en-GB" sz="800" b="1" dirty="0">
+                        <a:latin typeface="Times New Roman" panose="02020603050405020304" pitchFamily="18" charset="0"/>
+                        <a:cs typeface="Times New Roman" panose="02020603050405020304" pitchFamily="18" charset="0"/>
+                      </a:endParaRPr>
                     </a:p>
                   </a:txBody>
-                  <a:tcPr/>
+                  <a:tcPr marL="68580" marR="68580" marT="66040" marB="66040"/>
                 </a:tc>
                 <a:tc>
                   <a:txBody>
@@ -5356,29 +5440,41 @@
                     <a:lstStyle/>
                     <a:p>
                       <a:r>
-                        <a:rPr lang="en-GB" sz="800" b="1" dirty="0" smtClean="0"/>
+                        <a:rPr lang="en-GB" sz="800" b="1" dirty="0" smtClean="0">
+                          <a:latin typeface="Times New Roman" panose="02020603050405020304" pitchFamily="18" charset="0"/>
+                          <a:cs typeface="Times New Roman" panose="02020603050405020304" pitchFamily="18" charset="0"/>
+                        </a:rPr>
                         <a:t>4</a:t>
                       </a:r>
-                      <a:endParaRPr lang="en-GB" sz="800" b="1" dirty="0"/>
+                      <a:endParaRPr lang="en-GB" sz="800" b="1" dirty="0">
+                        <a:latin typeface="Times New Roman" panose="02020603050405020304" pitchFamily="18" charset="0"/>
+                        <a:cs typeface="Times New Roman" panose="02020603050405020304" pitchFamily="18" charset="0"/>
+                      </a:endParaRPr>
                     </a:p>
                   </a:txBody>
-                  <a:tcPr/>
+                  <a:tcPr marL="68580" marR="68580" marT="66040" marB="66040"/>
                 </a:tc>
               </a:tr>
-              <a:tr h="199127">
+              <a:tr h="0">
                 <a:tc>
                   <a:txBody>
                     <a:bodyPr/>
                     <a:lstStyle/>
                     <a:p>
                       <a:r>
-                        <a:rPr lang="en-GB" sz="800" b="1" dirty="0" smtClean="0"/>
+                        <a:rPr lang="en-GB" sz="800" b="1" dirty="0" smtClean="0">
+                          <a:latin typeface="Times New Roman" panose="02020603050405020304" pitchFamily="18" charset="0"/>
+                          <a:cs typeface="Times New Roman" panose="02020603050405020304" pitchFamily="18" charset="0"/>
+                        </a:rPr>
                         <a:t>Mean</a:t>
                       </a:r>
-                      <a:endParaRPr lang="en-GB" sz="800" b="1" dirty="0"/>
+                      <a:endParaRPr lang="en-GB" sz="800" b="1" dirty="0">
+                        <a:latin typeface="Times New Roman" panose="02020603050405020304" pitchFamily="18" charset="0"/>
+                        <a:cs typeface="Times New Roman" panose="02020603050405020304" pitchFamily="18" charset="0"/>
+                      </a:endParaRPr>
                     </a:p>
                   </a:txBody>
-                  <a:tcPr/>
+                  <a:tcPr marL="68580" marR="68580" marT="66040" marB="66040"/>
                 </a:tc>
                 <a:tc>
                   <a:txBody>
@@ -5386,13 +5482,19 @@
                     <a:lstStyle/>
                     <a:p>
                       <a:r>
-                        <a:rPr lang="en-GB" sz="800" b="1" dirty="0" smtClean="0"/>
+                        <a:rPr lang="en-GB" sz="800" b="1" dirty="0" smtClean="0">
+                          <a:latin typeface="Times New Roman" panose="02020603050405020304" pitchFamily="18" charset="0"/>
+                          <a:cs typeface="Times New Roman" panose="02020603050405020304" pitchFamily="18" charset="0"/>
+                        </a:rPr>
                         <a:t>32.4</a:t>
                       </a:r>
-                      <a:endParaRPr lang="en-GB" sz="800" b="1" dirty="0"/>
+                      <a:endParaRPr lang="en-GB" sz="800" b="1" dirty="0">
+                        <a:latin typeface="Times New Roman" panose="02020603050405020304" pitchFamily="18" charset="0"/>
+                        <a:cs typeface="Times New Roman" panose="02020603050405020304" pitchFamily="18" charset="0"/>
+                      </a:endParaRPr>
                     </a:p>
                   </a:txBody>
-                  <a:tcPr/>
+                  <a:tcPr marL="68580" marR="68580" marT="66040" marB="66040"/>
                 </a:tc>
                 <a:tc>
                   <a:txBody>
@@ -5400,13 +5502,19 @@
                     <a:lstStyle/>
                     <a:p>
                       <a:r>
-                        <a:rPr lang="en-GB" sz="800" b="1" dirty="0" smtClean="0"/>
+                        <a:rPr lang="en-GB" sz="800" b="1" dirty="0" smtClean="0">
+                          <a:latin typeface="Times New Roman" panose="02020603050405020304" pitchFamily="18" charset="0"/>
+                          <a:cs typeface="Times New Roman" panose="02020603050405020304" pitchFamily="18" charset="0"/>
+                        </a:rPr>
                         <a:t>40.4</a:t>
                       </a:r>
-                      <a:endParaRPr lang="en-GB" sz="800" b="1" dirty="0"/>
+                      <a:endParaRPr lang="en-GB" sz="800" b="1" dirty="0">
+                        <a:latin typeface="Times New Roman" panose="02020603050405020304" pitchFamily="18" charset="0"/>
+                        <a:cs typeface="Times New Roman" panose="02020603050405020304" pitchFamily="18" charset="0"/>
+                      </a:endParaRPr>
                     </a:p>
                   </a:txBody>
-                  <a:tcPr/>
+                  <a:tcPr marL="68580" marR="68580" marT="66040" marB="66040"/>
                 </a:tc>
                 <a:tc>
                   <a:txBody>
@@ -5414,13 +5522,19 @@
                     <a:lstStyle/>
                     <a:p>
                       <a:r>
-                        <a:rPr lang="en-GB" sz="800" b="1" dirty="0" smtClean="0"/>
+                        <a:rPr lang="en-GB" sz="800" b="1" dirty="0" smtClean="0">
+                          <a:latin typeface="Times New Roman" panose="02020603050405020304" pitchFamily="18" charset="0"/>
+                          <a:cs typeface="Times New Roman" panose="02020603050405020304" pitchFamily="18" charset="0"/>
+                        </a:rPr>
                         <a:t>52.5</a:t>
                       </a:r>
-                      <a:endParaRPr lang="en-GB" sz="800" b="1" dirty="0"/>
+                      <a:endParaRPr lang="en-GB" sz="800" b="1" dirty="0">
+                        <a:latin typeface="Times New Roman" panose="02020603050405020304" pitchFamily="18" charset="0"/>
+                        <a:cs typeface="Times New Roman" panose="02020603050405020304" pitchFamily="18" charset="0"/>
+                      </a:endParaRPr>
                     </a:p>
                   </a:txBody>
-                  <a:tcPr/>
+                  <a:tcPr marL="68580" marR="68580" marT="66040" marB="66040"/>
                 </a:tc>
                 <a:tc>
                   <a:txBody>
@@ -5428,13 +5542,19 @@
                     <a:lstStyle/>
                     <a:p>
                       <a:r>
-                        <a:rPr lang="en-GB" sz="800" b="1" dirty="0" smtClean="0"/>
+                        <a:rPr lang="en-GB" sz="800" b="1" dirty="0" smtClean="0">
+                          <a:latin typeface="Times New Roman" panose="02020603050405020304" pitchFamily="18" charset="0"/>
+                          <a:cs typeface="Times New Roman" panose="02020603050405020304" pitchFamily="18" charset="0"/>
+                        </a:rPr>
                         <a:t>60</a:t>
                       </a:r>
-                      <a:endParaRPr lang="en-GB" sz="800" b="1" dirty="0"/>
+                      <a:endParaRPr lang="en-GB" sz="800" b="1" dirty="0">
+                        <a:latin typeface="Times New Roman" panose="02020603050405020304" pitchFamily="18" charset="0"/>
+                        <a:cs typeface="Times New Roman" panose="02020603050405020304" pitchFamily="18" charset="0"/>
+                      </a:endParaRPr>
                     </a:p>
                   </a:txBody>
-                  <a:tcPr/>
+                  <a:tcPr marL="68580" marR="68580" marT="66040" marB="66040"/>
                 </a:tc>
               </a:tr>
             </a:tbl>
@@ -5449,8 +5569,8 @@
         </p:nvSpPr>
         <p:spPr>
           <a:xfrm>
-            <a:off x="3093955" y="3903316"/>
-            <a:ext cx="350555" cy="369332"/>
+            <a:off x="2505533" y="3705310"/>
+            <a:ext cx="332393" cy="369332"/>
           </a:xfrm>
           <a:prstGeom prst="rect">
             <a:avLst/>
@@ -5464,10 +5584,16 @@
           <a:lstStyle/>
           <a:p>
             <a:r>
-              <a:rPr lang="en-GB" dirty="0" smtClean="0"/>
+              <a:rPr lang="en-GB" dirty="0" smtClean="0">
+                <a:latin typeface="Times New Roman" panose="02020603050405020304" pitchFamily="18" charset="0"/>
+                <a:cs typeface="Times New Roman" panose="02020603050405020304" pitchFamily="18" charset="0"/>
+              </a:rPr>
               <a:t>…</a:t>
             </a:r>
-            <a:endParaRPr lang="en-GB" dirty="0"/>
+            <a:endParaRPr lang="en-GB" dirty="0">
+              <a:latin typeface="Times New Roman" panose="02020603050405020304" pitchFamily="18" charset="0"/>
+              <a:cs typeface="Times New Roman" panose="02020603050405020304" pitchFamily="18" charset="0"/>
+            </a:endParaRPr>
           </a:p>
         </p:txBody>
       </p:sp>
@@ -5479,8 +5605,8 @@
         </p:nvCxnSpPr>
         <p:spPr>
           <a:xfrm flipH="1">
-            <a:off x="1610618" y="2629943"/>
-            <a:ext cx="312668" cy="439017"/>
+            <a:off x="1392263" y="2296204"/>
+            <a:ext cx="214479" cy="568564"/>
           </a:xfrm>
           <a:prstGeom prst="straightConnector1">
             <a:avLst/>
@@ -5512,8 +5638,8 @@
         </p:nvCxnSpPr>
         <p:spPr>
           <a:xfrm>
-            <a:off x="3899967" y="2629943"/>
-            <a:ext cx="517076" cy="465002"/>
+            <a:off x="2948479" y="2334219"/>
+            <a:ext cx="742624" cy="746573"/>
           </a:xfrm>
           <a:prstGeom prst="straightConnector1">
             <a:avLst/>
@@ -5545,8 +5671,8 @@
         </p:nvCxnSpPr>
         <p:spPr>
           <a:xfrm>
-            <a:off x="5895042" y="998286"/>
-            <a:ext cx="396220" cy="475634"/>
+            <a:off x="3696217" y="920712"/>
+            <a:ext cx="807804" cy="431888"/>
           </a:xfrm>
           <a:prstGeom prst="straightConnector1">
             <a:avLst/>
@@ -5578,8 +5704,8 @@
         </p:nvCxnSpPr>
         <p:spPr>
           <a:xfrm flipH="1">
-            <a:off x="3041224" y="998286"/>
-            <a:ext cx="602657" cy="558506"/>
+            <a:off x="2172004" y="920712"/>
+            <a:ext cx="341146" cy="521257"/>
           </a:xfrm>
           <a:prstGeom prst="straightConnector1">
             <a:avLst/>
@@ -5610,9 +5736,9 @@
           <p:nvPr/>
         </p:nvCxnSpPr>
         <p:spPr>
-          <a:xfrm flipH="1">
-            <a:off x="2207379" y="2667719"/>
-            <a:ext cx="155643" cy="440695"/>
+          <a:xfrm>
+            <a:off x="1973007" y="2343493"/>
+            <a:ext cx="0" cy="369332"/>
           </a:xfrm>
           <a:prstGeom prst="straightConnector1">
             <a:avLst/>
@@ -5645,8 +5771,8 @@
         </p:nvCxnSpPr>
         <p:spPr>
           <a:xfrm>
-            <a:off x="2754436" y="2667719"/>
-            <a:ext cx="0" cy="444928"/>
+            <a:off x="2384726" y="2340742"/>
+            <a:ext cx="0" cy="372083"/>
           </a:xfrm>
           <a:prstGeom prst="straightConnector1">
             <a:avLst/>
@@ -5679,8 +5805,8 @@
         </p:nvSpPr>
         <p:spPr>
           <a:xfrm>
-            <a:off x="3268254" y="2705517"/>
-            <a:ext cx="350555" cy="369332"/>
+            <a:off x="2597060" y="2343493"/>
+            <a:ext cx="332393" cy="369332"/>
           </a:xfrm>
           <a:prstGeom prst="rect">
             <a:avLst/>
@@ -5694,95 +5820,19 @@
           <a:lstStyle/>
           <a:p>
             <a:r>
-              <a:rPr lang="en-GB" dirty="0" smtClean="0"/>
+              <a:rPr lang="en-GB" dirty="0" smtClean="0">
+                <a:latin typeface="Times New Roman" panose="02020603050405020304" pitchFamily="18" charset="0"/>
+                <a:cs typeface="Times New Roman" panose="02020603050405020304" pitchFamily="18" charset="0"/>
+              </a:rPr>
               <a:t>…</a:t>
             </a:r>
-            <a:endParaRPr lang="en-GB" dirty="0"/>
-          </a:p>
-        </p:txBody>
-      </p:sp>
-      <p:pic>
-        <p:nvPicPr>
-          <p:cNvPr id="1027" name="Picture 3" descr="C:\Users\pms69\AppData\Local\Microsoft\Windows\Temporary Internet Files\Content.IE5\J0CJUNJP\438px-Linear_regression.svg[1].jpg"/>
-          <p:cNvPicPr>
-            <a:picLocks noChangeAspect="1" noChangeArrowheads="1"/>
-          </p:cNvPicPr>
-          <p:nvPr/>
-        </p:nvPicPr>
-        <p:blipFill>
-          <a:blip r:embed="rId2" cstate="print">
-            <a:extLst>
-              <a:ext uri="{28A0092B-C50C-407E-A947-70E740481C1C}">
-                <a14:useLocalDpi xmlns:a14="http://schemas.microsoft.com/office/drawing/2010/main" val="0"/>
-              </a:ext>
-            </a:extLst>
-          </a:blip>
-          <a:srcRect/>
-          <a:stretch>
-            <a:fillRect/>
-          </a:stretch>
-        </p:blipFill>
-        <p:spPr bwMode="auto">
-          <a:xfrm>
-            <a:off x="1126973" y="4661750"/>
-            <a:ext cx="1232333" cy="616167"/>
-          </a:xfrm>
-          <a:prstGeom prst="rect">
-            <a:avLst/>
-          </a:prstGeom>
-          <a:noFill/>
-          <a:extLst>
-            <a:ext uri="{909E8E84-426E-40DD-AFC4-6F175D3DCCD1}">
-              <a14:hiddenFill xmlns:a14="http://schemas.microsoft.com/office/drawing/2010/main">
-                <a:solidFill>
-                  <a:srgbClr val="FFFFFF"/>
-                </a:solidFill>
-              </a14:hiddenFill>
-            </a:ext>
-          </a:extLst>
-        </p:spPr>
-      </p:pic>
-      <p:pic>
-        <p:nvPicPr>
-          <p:cNvPr id="54" name="Picture 3" descr="C:\Users\pms69\AppData\Local\Microsoft\Windows\Temporary Internet Files\Content.IE5\J0CJUNJP\438px-Linear_regression.svg[1].jpg"/>
-          <p:cNvPicPr>
-            <a:picLocks noChangeAspect="1" noChangeArrowheads="1"/>
-          </p:cNvPicPr>
-          <p:nvPr/>
-        </p:nvPicPr>
-        <p:blipFill>
-          <a:blip r:embed="rId2" cstate="print">
-            <a:extLst>
-              <a:ext uri="{28A0092B-C50C-407E-A947-70E740481C1C}">
-                <a14:useLocalDpi xmlns:a14="http://schemas.microsoft.com/office/drawing/2010/main" val="0"/>
-              </a:ext>
-            </a:extLst>
-          </a:blip>
-          <a:srcRect/>
-          <a:stretch>
-            <a:fillRect/>
-          </a:stretch>
-        </p:blipFill>
-        <p:spPr bwMode="auto">
-          <a:xfrm>
-            <a:off x="4160602" y="4661749"/>
-            <a:ext cx="1232333" cy="616167"/>
-          </a:xfrm>
-          <a:prstGeom prst="rect">
-            <a:avLst/>
-          </a:prstGeom>
-          <a:noFill/>
-          <a:extLst>
-            <a:ext uri="{909E8E84-426E-40DD-AFC4-6F175D3DCCD1}">
-              <a14:hiddenFill xmlns:a14="http://schemas.microsoft.com/office/drawing/2010/main">
-                <a:solidFill>
-                  <a:srgbClr val="FFFFFF"/>
-                </a:solidFill>
-              </a14:hiddenFill>
-            </a:ext>
-          </a:extLst>
-        </p:spPr>
-      </p:pic>
+            <a:endParaRPr lang="en-GB" dirty="0">
+              <a:latin typeface="Times New Roman" panose="02020603050405020304" pitchFamily="18" charset="0"/>
+              <a:cs typeface="Times New Roman" panose="02020603050405020304" pitchFamily="18" charset="0"/>
+            </a:endParaRPr>
+          </a:p>
+        </p:txBody>
+      </p:sp>
       <p:sp>
         <p:nvSpPr>
           <p:cNvPr id="58" name="TextBox 57"/>
@@ -5791,8 +5841,8 @@
         </p:nvSpPr>
         <p:spPr>
           <a:xfrm>
-            <a:off x="3050182" y="4871113"/>
-            <a:ext cx="350555" cy="369332"/>
+            <a:off x="2699134" y="4971035"/>
+            <a:ext cx="332393" cy="369332"/>
           </a:xfrm>
           <a:prstGeom prst="rect">
             <a:avLst/>
@@ -5806,10 +5856,16 @@
           <a:lstStyle/>
           <a:p>
             <a:r>
-              <a:rPr lang="en-GB" dirty="0" smtClean="0"/>
+              <a:rPr lang="en-GB" dirty="0" smtClean="0">
+                <a:latin typeface="Times New Roman" panose="02020603050405020304" pitchFamily="18" charset="0"/>
+                <a:cs typeface="Times New Roman" panose="02020603050405020304" pitchFamily="18" charset="0"/>
+              </a:rPr>
               <a:t>…</a:t>
             </a:r>
-            <a:endParaRPr lang="en-GB" dirty="0"/>
+            <a:endParaRPr lang="en-GB" dirty="0">
+              <a:latin typeface="Times New Roman" panose="02020603050405020304" pitchFamily="18" charset="0"/>
+              <a:cs typeface="Times New Roman" panose="02020603050405020304" pitchFamily="18" charset="0"/>
+            </a:endParaRPr>
           </a:p>
         </p:txBody>
       </p:sp>
@@ -5821,12 +5877,12 @@
         </p:nvCxnSpPr>
         <p:spPr>
           <a:xfrm rot="5400000">
-            <a:off x="5717886" y="2839053"/>
-            <a:ext cx="1984732" cy="1883848"/>
+            <a:off x="3859202" y="3536536"/>
+            <a:ext cx="2640663" cy="597666"/>
           </a:xfrm>
           <a:prstGeom prst="curvedConnector3">
             <a:avLst>
-              <a:gd name="adj1" fmla="val 100260"/>
+              <a:gd name="adj1" fmla="val 99777"/>
             </a:avLst>
           </a:prstGeom>
           <a:ln w="19050">
@@ -5858,14 +5914,14 @@
           <p:nvPr>
             <p:extLst>
               <p:ext uri="{D42A27DB-BD31-4B8C-83A1-F6EECF244321}">
-                <p14:modId xmlns:p14="http://schemas.microsoft.com/office/powerpoint/2010/main" val="3529596939"/>
+                <p14:modId xmlns:p14="http://schemas.microsoft.com/office/powerpoint/2010/main" val="844773664"/>
               </p:ext>
             </p:extLst>
           </p:nvPr>
         </p:nvGraphicFramePr>
         <p:xfrm>
-          <a:off x="1923286" y="5517232"/>
-          <a:ext cx="2578893" cy="1066800"/>
+          <a:off x="1333011" y="6465168"/>
+          <a:ext cx="2648795" cy="1391920"/>
         </p:xfrm>
         <a:graphic>
           <a:graphicData uri="http://schemas.openxmlformats.org/drawingml/2006/table">
@@ -5874,11 +5930,13 @@
                 <a:tableStyleId>{5940675A-B579-460E-94D1-54222C63F5DA}</a:tableStyleId>
               </a:tblPr>
               <a:tblGrid>
-                <a:gridCol w="859631"/>
-                <a:gridCol w="859631"/>
-                <a:gridCol w="859631"/>
+                <a:gridCol w="529759"/>
+                <a:gridCol w="529759"/>
+                <a:gridCol w="529759"/>
+                <a:gridCol w="529759"/>
+                <a:gridCol w="529759"/>
               </a:tblGrid>
-              <a:tr h="144016">
+              <a:tr h="0">
                 <a:tc>
                   <a:txBody>
                     <a:bodyPr/>
@@ -5887,7 +5945,7 @@
                       <a:endParaRPr lang="en-GB" sz="800" b="1" dirty="0"/>
                     </a:p>
                   </a:txBody>
-                  <a:tcPr/>
+                  <a:tcPr marL="68580" marR="68580" marT="66040" marB="66040"/>
                 </a:tc>
                 <a:tc>
                   <a:txBody>
@@ -5898,10 +5956,82 @@
                         <a:rPr lang="en-GB" sz="800" b="1" dirty="0" err="1" smtClean="0"/>
                         <a:t>RegCoeff</a:t>
                       </a:r>
+                      <a:r>
+                        <a:rPr lang="en-GB" sz="800" b="1" dirty="0" smtClean="0"/>
+                        <a:t> 2.5%</a:t>
+                      </a:r>
                       <a:endParaRPr lang="en-GB" sz="800" b="1" dirty="0"/>
                     </a:p>
                   </a:txBody>
-                  <a:tcPr/>
+                  <a:tcPr marL="68580" marR="68580" marT="66040" marB="66040"/>
+                </a:tc>
+                <a:tc>
+                  <a:txBody>
+                    <a:bodyPr/>
+                    <a:lstStyle/>
+                    <a:p>
+                      <a:pPr marL="0" marR="0" indent="0" algn="l" defTabSz="914400" rtl="0" eaLnBrk="1" fontAlgn="auto" latinLnBrk="0" hangingPunct="1">
+                        <a:lnSpc>
+                          <a:spcPct val="100000"/>
+                        </a:lnSpc>
+                        <a:spcBef>
+                          <a:spcPts val="0"/>
+                        </a:spcBef>
+                        <a:spcAft>
+                          <a:spcPts val="0"/>
+                        </a:spcAft>
+                        <a:buClrTx/>
+                        <a:buSzTx/>
+                        <a:buFontTx/>
+                        <a:buNone/>
+                        <a:tabLst/>
+                        <a:defRPr/>
+                      </a:pPr>
+                      <a:r>
+                        <a:rPr lang="en-GB" sz="800" b="1" dirty="0" err="1" smtClean="0"/>
+                        <a:t>RegCoeff</a:t>
+                      </a:r>
+                      <a:r>
+                        <a:rPr lang="en-GB" sz="800" b="1" dirty="0" smtClean="0"/>
+                        <a:t> 50%</a:t>
+                      </a:r>
+                    </a:p>
+                  </a:txBody>
+                  <a:tcPr marL="68580" marR="68580" marT="66040" marB="66040"/>
+                </a:tc>
+                <a:tc>
+                  <a:txBody>
+                    <a:bodyPr/>
+                    <a:lstStyle/>
+                    <a:p>
+                      <a:pPr marL="0" marR="0" indent="0" algn="l" defTabSz="914400" rtl="0" eaLnBrk="1" fontAlgn="auto" latinLnBrk="0" hangingPunct="1">
+                        <a:lnSpc>
+                          <a:spcPct val="100000"/>
+                        </a:lnSpc>
+                        <a:spcBef>
+                          <a:spcPts val="0"/>
+                        </a:spcBef>
+                        <a:spcAft>
+                          <a:spcPts val="0"/>
+                        </a:spcAft>
+                        <a:buClrTx/>
+                        <a:buSzTx/>
+                        <a:buFontTx/>
+                        <a:buNone/>
+                        <a:tabLst/>
+                        <a:defRPr/>
+                      </a:pPr>
+                      <a:r>
+                        <a:rPr lang="en-GB" sz="800" b="1" dirty="0" err="1" smtClean="0"/>
+                        <a:t>RegCoeff</a:t>
+                      </a:r>
+                      <a:r>
+                        <a:rPr lang="en-GB" sz="800" b="1" dirty="0" smtClean="0"/>
+                        <a:t> 97.5%</a:t>
+                      </a:r>
+                    </a:p>
+                  </a:txBody>
+                  <a:tcPr marL="68580" marR="68580" marT="66040" marB="66040"/>
                 </a:tc>
                 <a:tc>
                   <a:txBody>
@@ -5915,10 +6045,10 @@
                       <a:endParaRPr lang="en-GB" sz="800" b="1" dirty="0"/>
                     </a:p>
                   </a:txBody>
-                  <a:tcPr/>
+                  <a:tcPr marL="68580" marR="68580" marT="66040" marB="66040"/>
                 </a:tc>
               </a:tr>
-              <a:tr h="144016">
+              <a:tr h="0">
                 <a:tc>
                   <a:txBody>
                     <a:bodyPr/>
@@ -5931,7 +6061,7 @@
                       <a:endParaRPr lang="en-GB" sz="800" b="1" dirty="0"/>
                     </a:p>
                   </a:txBody>
-                  <a:tcPr/>
+                  <a:tcPr marL="68580" marR="68580" marT="66040" marB="66040"/>
                 </a:tc>
                 <a:tc>
                   <a:txBody>
@@ -5945,7 +6075,35 @@
                       <a:endParaRPr lang="en-GB" sz="800" b="1" dirty="0"/>
                     </a:p>
                   </a:txBody>
-                  <a:tcPr/>
+                  <a:tcPr marL="68580" marR="68580" marT="66040" marB="66040"/>
+                </a:tc>
+                <a:tc>
+                  <a:txBody>
+                    <a:bodyPr/>
+                    <a:lstStyle/>
+                    <a:p>
+                      <a:r>
+                        <a:rPr lang="en-GB" sz="800" b="1" dirty="0" smtClean="0"/>
+                        <a:t>.49</a:t>
+                      </a:r>
+                      <a:endParaRPr lang="en-GB" sz="800" b="1" dirty="0"/>
+                    </a:p>
+                  </a:txBody>
+                  <a:tcPr marL="68580" marR="68580" marT="66040" marB="66040"/>
+                </a:tc>
+                <a:tc>
+                  <a:txBody>
+                    <a:bodyPr/>
+                    <a:lstStyle/>
+                    <a:p>
+                      <a:r>
+                        <a:rPr lang="en-GB" sz="800" b="1" dirty="0" smtClean="0"/>
+                        <a:t>.50</a:t>
+                      </a:r>
+                      <a:endParaRPr lang="en-GB" sz="800" b="1" dirty="0"/>
+                    </a:p>
+                  </a:txBody>
+                  <a:tcPr marL="68580" marR="68580" marT="66040" marB="66040"/>
                 </a:tc>
                 <a:tc>
                   <a:txBody>
@@ -5959,10 +6117,10 @@
                       <a:endParaRPr lang="en-GB" sz="800" b="1" dirty="0"/>
                     </a:p>
                   </a:txBody>
-                  <a:tcPr/>
+                  <a:tcPr marL="68580" marR="68580" marT="66040" marB="66040"/>
                 </a:tc>
               </a:tr>
-              <a:tr h="144016">
+              <a:tr h="0">
                 <a:tc>
                   <a:txBody>
                     <a:bodyPr/>
@@ -5975,7 +6133,7 @@
                       <a:endParaRPr lang="en-GB" sz="800" b="1" dirty="0"/>
                     </a:p>
                   </a:txBody>
-                  <a:tcPr/>
+                  <a:tcPr marL="68580" marR="68580" marT="66040" marB="66040"/>
                 </a:tc>
                 <a:tc>
                   <a:txBody>
@@ -5989,7 +6147,35 @@
                       <a:endParaRPr lang="en-GB" sz="800" b="1" dirty="0"/>
                     </a:p>
                   </a:txBody>
-                  <a:tcPr/>
+                  <a:tcPr marL="68580" marR="68580" marT="66040" marB="66040"/>
+                </a:tc>
+                <a:tc>
+                  <a:txBody>
+                    <a:bodyPr/>
+                    <a:lstStyle/>
+                    <a:p>
+                      <a:r>
+                        <a:rPr lang="en-GB" sz="800" b="1" dirty="0" smtClean="0"/>
+                        <a:t>.50</a:t>
+                      </a:r>
+                      <a:endParaRPr lang="en-GB" sz="800" b="1" dirty="0"/>
+                    </a:p>
+                  </a:txBody>
+                  <a:tcPr marL="68580" marR="68580" marT="66040" marB="66040"/>
+                </a:tc>
+                <a:tc>
+                  <a:txBody>
+                    <a:bodyPr/>
+                    <a:lstStyle/>
+                    <a:p>
+                      <a:r>
+                        <a:rPr lang="en-GB" sz="800" b="1" dirty="0" smtClean="0"/>
+                        <a:t>.52</a:t>
+                      </a:r>
+                      <a:endParaRPr lang="en-GB" sz="800" b="1" dirty="0"/>
+                    </a:p>
+                  </a:txBody>
+                  <a:tcPr marL="68580" marR="68580" marT="66040" marB="66040"/>
                 </a:tc>
                 <a:tc>
                   <a:txBody>
@@ -6003,10 +6189,10 @@
                       <a:endParaRPr lang="en-GB" sz="800" b="1" dirty="0"/>
                     </a:p>
                   </a:txBody>
-                  <a:tcPr/>
+                  <a:tcPr marL="68580" marR="68580" marT="66040" marB="66040"/>
                 </a:tc>
               </a:tr>
-              <a:tr h="144016">
+              <a:tr h="0">
                 <a:tc>
                   <a:txBody>
                     <a:bodyPr/>
@@ -6019,7 +6205,7 @@
                       <a:endParaRPr lang="en-GB" sz="800" b="1" dirty="0"/>
                     </a:p>
                   </a:txBody>
-                  <a:tcPr/>
+                  <a:tcPr marL="68580" marR="68580" marT="66040" marB="66040"/>
                 </a:tc>
                 <a:tc>
                   <a:txBody>
@@ -6033,7 +6219,7 @@
                       <a:endParaRPr lang="en-GB" sz="800" b="1" dirty="0"/>
                     </a:p>
                   </a:txBody>
-                  <a:tcPr/>
+                  <a:tcPr marL="68580" marR="68580" marT="66040" marB="66040"/>
                 </a:tc>
                 <a:tc>
                   <a:txBody>
@@ -6047,10 +6233,38 @@
                       <a:endParaRPr lang="en-GB" sz="800" b="1" dirty="0"/>
                     </a:p>
                   </a:txBody>
-                  <a:tcPr/>
+                  <a:tcPr marL="68580" marR="68580" marT="66040" marB="66040"/>
+                </a:tc>
+                <a:tc>
+                  <a:txBody>
+                    <a:bodyPr/>
+                    <a:lstStyle/>
+                    <a:p>
+                      <a:r>
+                        <a:rPr lang="en-GB" sz="800" b="1" dirty="0" smtClean="0"/>
+                        <a:t>…</a:t>
+                      </a:r>
+                      <a:endParaRPr lang="en-GB" sz="800" b="1" dirty="0"/>
+                    </a:p>
+                  </a:txBody>
+                  <a:tcPr marL="68580" marR="68580" marT="66040" marB="66040"/>
+                </a:tc>
+                <a:tc>
+                  <a:txBody>
+                    <a:bodyPr/>
+                    <a:lstStyle/>
+                    <a:p>
+                      <a:r>
+                        <a:rPr lang="en-GB" sz="800" b="1" dirty="0" smtClean="0"/>
+                        <a:t>…</a:t>
+                      </a:r>
+                      <a:endParaRPr lang="en-GB" sz="800" b="1" dirty="0"/>
+                    </a:p>
+                  </a:txBody>
+                  <a:tcPr marL="68580" marR="68580" marT="66040" marB="66040"/>
                 </a:tc>
               </a:tr>
-              <a:tr h="144016">
+              <a:tr h="0">
                 <a:tc>
                   <a:txBody>
                     <a:bodyPr/>
@@ -6063,7 +6277,7 @@
                       <a:endParaRPr lang="en-GB" sz="800" b="1" dirty="0"/>
                     </a:p>
                   </a:txBody>
-                  <a:tcPr/>
+                  <a:tcPr marL="68580" marR="68580" marT="66040" marB="66040"/>
                 </a:tc>
                 <a:tc>
                   <a:txBody>
@@ -6077,7 +6291,35 @@
                       <a:endParaRPr lang="en-GB" sz="800" b="1" dirty="0"/>
                     </a:p>
                   </a:txBody>
-                  <a:tcPr/>
+                  <a:tcPr marL="68580" marR="68580" marT="66040" marB="66040"/>
+                </a:tc>
+                <a:tc>
+                  <a:txBody>
+                    <a:bodyPr/>
+                    <a:lstStyle/>
+                    <a:p>
+                      <a:r>
+                        <a:rPr lang="en-GB" sz="800" b="1" dirty="0" smtClean="0"/>
+                        <a:t>.49</a:t>
+                      </a:r>
+                      <a:endParaRPr lang="en-GB" sz="800" b="1" dirty="0"/>
+                    </a:p>
+                  </a:txBody>
+                  <a:tcPr marL="68580" marR="68580" marT="66040" marB="66040"/>
+                </a:tc>
+                <a:tc>
+                  <a:txBody>
+                    <a:bodyPr/>
+                    <a:lstStyle/>
+                    <a:p>
+                      <a:r>
+                        <a:rPr lang="en-GB" sz="800" b="1" dirty="0" smtClean="0"/>
+                        <a:t>.51</a:t>
+                      </a:r>
+                      <a:endParaRPr lang="en-GB" sz="800" b="1" dirty="0"/>
+                    </a:p>
+                  </a:txBody>
+                  <a:tcPr marL="68580" marR="68580" marT="66040" marB="66040"/>
                 </a:tc>
                 <a:tc>
                   <a:txBody>
@@ -6091,7 +6333,7 @@
                       <a:endParaRPr lang="en-GB" sz="800" b="1" dirty="0"/>
                     </a:p>
                   </a:txBody>
-                  <a:tcPr/>
+                  <a:tcPr marL="68580" marR="68580" marT="66040" marB="66040"/>
                 </a:tc>
               </a:tr>
             </a:tbl>
@@ -6106,8 +6348,8 @@
         </p:nvSpPr>
         <p:spPr>
           <a:xfrm>
-            <a:off x="3272918" y="2629943"/>
-            <a:ext cx="293852" cy="369332"/>
+            <a:off x="2626114" y="2275817"/>
+            <a:ext cx="278628" cy="369332"/>
           </a:xfrm>
           <a:prstGeom prst="rect">
             <a:avLst/>
@@ -6121,10 +6363,16 @@
           <a:lstStyle/>
           <a:p>
             <a:r>
-              <a:rPr lang="en-GB" dirty="0" smtClean="0"/>
+              <a:rPr lang="en-GB" dirty="0" smtClean="0">
+                <a:latin typeface="Times New Roman" panose="02020603050405020304" pitchFamily="18" charset="0"/>
+                <a:cs typeface="Times New Roman" panose="02020603050405020304" pitchFamily="18" charset="0"/>
+              </a:rPr>
               <a:t>N</a:t>
             </a:r>
-            <a:endParaRPr lang="en-GB" dirty="0"/>
+            <a:endParaRPr lang="en-GB" dirty="0">
+              <a:latin typeface="Times New Roman" panose="02020603050405020304" pitchFamily="18" charset="0"/>
+              <a:cs typeface="Times New Roman" panose="02020603050405020304" pitchFamily="18" charset="0"/>
+            </a:endParaRPr>
           </a:p>
         </p:txBody>
       </p:sp>
@@ -6136,8 +6384,8 @@
         </p:nvSpPr>
         <p:spPr>
           <a:xfrm>
-            <a:off x="3110704" y="3823245"/>
-            <a:ext cx="293852" cy="369332"/>
+            <a:off x="2532415" y="3589652"/>
+            <a:ext cx="278628" cy="369332"/>
           </a:xfrm>
           <a:prstGeom prst="rect">
             <a:avLst/>
@@ -6151,10 +6399,16 @@
           <a:lstStyle/>
           <a:p>
             <a:r>
-              <a:rPr lang="en-GB" dirty="0" smtClean="0"/>
+              <a:rPr lang="en-GB" dirty="0" smtClean="0">
+                <a:latin typeface="Times New Roman" panose="02020603050405020304" pitchFamily="18" charset="0"/>
+                <a:cs typeface="Times New Roman" panose="02020603050405020304" pitchFamily="18" charset="0"/>
+              </a:rPr>
               <a:t>N</a:t>
             </a:r>
-            <a:endParaRPr lang="en-GB" dirty="0"/>
+            <a:endParaRPr lang="en-GB" dirty="0">
+              <a:latin typeface="Times New Roman" panose="02020603050405020304" pitchFamily="18" charset="0"/>
+              <a:cs typeface="Times New Roman" panose="02020603050405020304" pitchFamily="18" charset="0"/>
+            </a:endParaRPr>
           </a:p>
         </p:txBody>
       </p:sp>
@@ -6166,8 +6420,8 @@
         </p:nvSpPr>
         <p:spPr>
           <a:xfrm>
-            <a:off x="3057748" y="4638897"/>
-            <a:ext cx="293852" cy="369332"/>
+            <a:off x="2726016" y="4918464"/>
+            <a:ext cx="278628" cy="369332"/>
           </a:xfrm>
           <a:prstGeom prst="rect">
             <a:avLst/>
@@ -6181,10 +6435,16 @@
           <a:lstStyle/>
           <a:p>
             <a:r>
-              <a:rPr lang="en-GB" dirty="0" smtClean="0"/>
+              <a:rPr lang="en-GB" dirty="0" smtClean="0">
+                <a:latin typeface="Times New Roman" panose="02020603050405020304" pitchFamily="18" charset="0"/>
+                <a:cs typeface="Times New Roman" panose="02020603050405020304" pitchFamily="18" charset="0"/>
+              </a:rPr>
               <a:t>N</a:t>
             </a:r>
-            <a:endParaRPr lang="en-GB" dirty="0"/>
+            <a:endParaRPr lang="en-GB" dirty="0">
+              <a:latin typeface="Times New Roman" panose="02020603050405020304" pitchFamily="18" charset="0"/>
+              <a:cs typeface="Times New Roman" panose="02020603050405020304" pitchFamily="18" charset="0"/>
+            </a:endParaRPr>
           </a:p>
         </p:txBody>
       </p:sp>
@@ -6196,8 +6456,8 @@
         </p:nvSpPr>
         <p:spPr>
           <a:xfrm>
-            <a:off x="4158771" y="998286"/>
-            <a:ext cx="1374570" cy="369332"/>
+            <a:off x="4504021" y="157615"/>
+            <a:ext cx="2309355" cy="584775"/>
           </a:xfrm>
           <a:prstGeom prst="rect">
             <a:avLst/>
@@ -6211,10 +6471,10 @@
           <a:lstStyle/>
           <a:p>
             <a:r>
-              <a:rPr lang="en-GB" dirty="0" smtClean="0"/>
-              <a:t>True Base</a:t>
-            </a:r>
-            <a:endParaRPr lang="en-GB" dirty="0"/>
+              <a:rPr lang="en-GB" sz="1600" dirty="0" smtClean="0"/>
+              <a:t>Distributions Generating Validation and Study</a:t>
+            </a:r>
+            <a:endParaRPr lang="en-GB" sz="1600" dirty="0"/>
           </a:p>
         </p:txBody>
       </p:sp>
@@ -6226,8 +6486,8 @@
         </p:nvSpPr>
         <p:spPr>
           <a:xfrm>
-            <a:off x="6850307" y="2307550"/>
-            <a:ext cx="1374570" cy="369332"/>
+            <a:off x="4878684" y="1991963"/>
+            <a:ext cx="1019666" cy="338554"/>
           </a:xfrm>
           <a:prstGeom prst="rect">
             <a:avLst/>
@@ -6241,10 +6501,16 @@
           <a:lstStyle/>
           <a:p>
             <a:r>
-              <a:rPr lang="en-GB" dirty="0" smtClean="0"/>
-              <a:t>Study</a:t>
-            </a:r>
-            <a:endParaRPr lang="en-GB" dirty="0"/>
+              <a:rPr lang="en-GB" sz="1600" dirty="0" smtClean="0">
+                <a:latin typeface="Times New Roman" panose="02020603050405020304" pitchFamily="18" charset="0"/>
+                <a:cs typeface="Times New Roman" panose="02020603050405020304" pitchFamily="18" charset="0"/>
+              </a:rPr>
+              <a:t>Study Set</a:t>
+            </a:r>
+            <a:endParaRPr lang="en-GB" sz="1600" dirty="0">
+              <a:latin typeface="Times New Roman" panose="02020603050405020304" pitchFamily="18" charset="0"/>
+              <a:cs typeface="Times New Roman" panose="02020603050405020304" pitchFamily="18" charset="0"/>
+            </a:endParaRPr>
           </a:p>
         </p:txBody>
       </p:sp>
@@ -6256,8 +6522,8 @@
         </p:nvSpPr>
         <p:spPr>
           <a:xfrm>
-            <a:off x="2196282" y="2280280"/>
-            <a:ext cx="1223562" cy="369332"/>
+            <a:off x="1563022" y="1957650"/>
+            <a:ext cx="1518010" cy="338554"/>
           </a:xfrm>
           <a:prstGeom prst="rect">
             <a:avLst/>
@@ -6271,10 +6537,16 @@
           <a:lstStyle/>
           <a:p>
             <a:r>
-              <a:rPr lang="en-GB" dirty="0" smtClean="0"/>
-              <a:t>Validation</a:t>
-            </a:r>
-            <a:endParaRPr lang="en-GB" dirty="0"/>
+              <a:rPr lang="en-GB" sz="1600" dirty="0" smtClean="0">
+                <a:latin typeface="Times New Roman" panose="02020603050405020304" pitchFamily="18" charset="0"/>
+                <a:cs typeface="Times New Roman" panose="02020603050405020304" pitchFamily="18" charset="0"/>
+              </a:rPr>
+              <a:t>Validation Set</a:t>
+            </a:r>
+            <a:endParaRPr lang="en-GB" sz="1600" dirty="0">
+              <a:latin typeface="Times New Roman" panose="02020603050405020304" pitchFamily="18" charset="0"/>
+              <a:cs typeface="Times New Roman" panose="02020603050405020304" pitchFamily="18" charset="0"/>
+            </a:endParaRPr>
           </a:p>
         </p:txBody>
       </p:sp>
@@ -6286,8 +6558,8 @@
         </p:nvSpPr>
         <p:spPr>
           <a:xfrm>
-            <a:off x="2554400" y="3388021"/>
-            <a:ext cx="1468759" cy="338554"/>
+            <a:off x="1750805" y="2824502"/>
+            <a:ext cx="1392665" cy="338554"/>
           </a:xfrm>
           <a:prstGeom prst="rect">
             <a:avLst/>
@@ -6301,10 +6573,16 @@
           <a:lstStyle/>
           <a:p>
             <a:r>
-              <a:rPr lang="en-GB" sz="1600" dirty="0" smtClean="0"/>
+              <a:rPr lang="en-GB" sz="1600" dirty="0" smtClean="0">
+                <a:latin typeface="Times New Roman" panose="02020603050405020304" pitchFamily="18" charset="0"/>
+                <a:cs typeface="Times New Roman" panose="02020603050405020304" pitchFamily="18" charset="0"/>
+              </a:rPr>
               <a:t>Bootstrap Sets</a:t>
             </a:r>
-            <a:endParaRPr lang="en-GB" sz="1600" dirty="0"/>
+            <a:endParaRPr lang="en-GB" sz="1600" dirty="0">
+              <a:latin typeface="Times New Roman" panose="02020603050405020304" pitchFamily="18" charset="0"/>
+              <a:cs typeface="Times New Roman" panose="02020603050405020304" pitchFamily="18" charset="0"/>
+            </a:endParaRPr>
           </a:p>
         </p:txBody>
       </p:sp>
@@ -6316,8 +6594,8 @@
         </p:nvSpPr>
         <p:spPr>
           <a:xfrm>
-            <a:off x="-1493" y="252728"/>
-            <a:ext cx="467544" cy="461665"/>
+            <a:off x="105953" y="332655"/>
+            <a:ext cx="845230" cy="369332"/>
           </a:xfrm>
           <a:prstGeom prst="rect">
             <a:avLst/>
@@ -6331,10 +6609,30 @@
           <a:lstStyle/>
           <a:p>
             <a:r>
-              <a:rPr lang="en-GB" sz="2400" dirty="0" smtClean="0"/>
-              <a:t>1.</a:t>
-            </a:r>
-            <a:endParaRPr lang="en-GB" sz="2400" dirty="0"/>
+              <a:rPr lang="en-GB" dirty="0" smtClean="0">
+                <a:latin typeface="Times New Roman" panose="02020603050405020304" pitchFamily="18" charset="0"/>
+                <a:cs typeface="Times New Roman" panose="02020603050405020304" pitchFamily="18" charset="0"/>
+              </a:rPr>
+              <a:t>Step </a:t>
+            </a:r>
+            <a:r>
+              <a:rPr lang="en-GB" dirty="0" smtClean="0">
+                <a:latin typeface="Times New Roman" panose="02020603050405020304" pitchFamily="18" charset="0"/>
+                <a:cs typeface="Times New Roman" panose="02020603050405020304" pitchFamily="18" charset="0"/>
+              </a:rPr>
+              <a:t>1</a:t>
+            </a:r>
+            <a:r>
+              <a:rPr lang="en-GB" dirty="0" smtClean="0">
+                <a:latin typeface="Times New Roman" panose="02020603050405020304" pitchFamily="18" charset="0"/>
+                <a:cs typeface="Times New Roman" panose="02020603050405020304" pitchFamily="18" charset="0"/>
+              </a:rPr>
+              <a:t>.</a:t>
+            </a:r>
+            <a:endParaRPr lang="en-GB" dirty="0">
+              <a:latin typeface="Times New Roman" panose="02020603050405020304" pitchFamily="18" charset="0"/>
+              <a:cs typeface="Times New Roman" panose="02020603050405020304" pitchFamily="18" charset="0"/>
+            </a:endParaRPr>
           </a:p>
         </p:txBody>
       </p:sp>
@@ -6346,8 +6644,8 @@
         </p:nvSpPr>
         <p:spPr>
           <a:xfrm>
-            <a:off x="-1493" y="1790460"/>
-            <a:ext cx="467544" cy="461665"/>
+            <a:off x="35067" y="1531977"/>
+            <a:ext cx="866909" cy="369332"/>
           </a:xfrm>
           <a:prstGeom prst="rect">
             <a:avLst/>
@@ -6361,10 +6659,23 @@
           <a:lstStyle/>
           <a:p>
             <a:r>
-              <a:rPr lang="en-GB" sz="2400" dirty="0" smtClean="0"/>
-              <a:t>2.</a:t>
-            </a:r>
-            <a:endParaRPr lang="en-GB" sz="2400" dirty="0"/>
+              <a:rPr lang="en-GB" dirty="0" smtClean="0">
+                <a:latin typeface="Times New Roman" panose="02020603050405020304" pitchFamily="18" charset="0"/>
+                <a:cs typeface="Times New Roman" panose="02020603050405020304" pitchFamily="18" charset="0"/>
+              </a:rPr>
+              <a:t>Step 2</a:t>
+            </a:r>
+            <a:r>
+              <a:rPr lang="en-GB" dirty="0" smtClean="0">
+                <a:latin typeface="Times New Roman" panose="02020603050405020304" pitchFamily="18" charset="0"/>
+                <a:cs typeface="Times New Roman" panose="02020603050405020304" pitchFamily="18" charset="0"/>
+              </a:rPr>
+              <a:t>.</a:t>
+            </a:r>
+            <a:endParaRPr lang="en-GB" dirty="0">
+              <a:latin typeface="Times New Roman" panose="02020603050405020304" pitchFamily="18" charset="0"/>
+              <a:cs typeface="Times New Roman" panose="02020603050405020304" pitchFamily="18" charset="0"/>
+            </a:endParaRPr>
           </a:p>
         </p:txBody>
       </p:sp>
@@ -6376,8 +6687,8 @@
         </p:nvSpPr>
         <p:spPr>
           <a:xfrm>
-            <a:off x="0" y="3510746"/>
-            <a:ext cx="467544" cy="461665"/>
+            <a:off x="5162" y="2801421"/>
+            <a:ext cx="974661" cy="369332"/>
           </a:xfrm>
           <a:prstGeom prst="rect">
             <a:avLst/>
@@ -6391,14 +6702,23 @@
           <a:lstStyle/>
           <a:p>
             <a:r>
-              <a:rPr lang="en-GB" sz="2400" dirty="0"/>
-              <a:t>3</a:t>
-            </a:r>
-            <a:r>
-              <a:rPr lang="en-GB" sz="2400" dirty="0" smtClean="0"/>
+              <a:rPr lang="en-GB" dirty="0" smtClean="0">
+                <a:latin typeface="Times New Roman" panose="02020603050405020304" pitchFamily="18" charset="0"/>
+                <a:cs typeface="Times New Roman" panose="02020603050405020304" pitchFamily="18" charset="0"/>
+              </a:rPr>
+              <a:t>Step 3</a:t>
+            </a:r>
+            <a:r>
+              <a:rPr lang="en-GB" dirty="0" smtClean="0">
+                <a:latin typeface="Times New Roman" panose="02020603050405020304" pitchFamily="18" charset="0"/>
+                <a:cs typeface="Times New Roman" panose="02020603050405020304" pitchFamily="18" charset="0"/>
+              </a:rPr>
               <a:t>.</a:t>
             </a:r>
-            <a:endParaRPr lang="en-GB" sz="2400" dirty="0"/>
+            <a:endParaRPr lang="en-GB" dirty="0">
+              <a:latin typeface="Times New Roman" panose="02020603050405020304" pitchFamily="18" charset="0"/>
+              <a:cs typeface="Times New Roman" panose="02020603050405020304" pitchFamily="18" charset="0"/>
+            </a:endParaRPr>
           </a:p>
         </p:txBody>
       </p:sp>
@@ -6410,8 +6730,8 @@
         </p:nvSpPr>
         <p:spPr>
           <a:xfrm>
-            <a:off x="-1493" y="5142675"/>
-            <a:ext cx="467544" cy="461665"/>
+            <a:off x="84615" y="5803215"/>
+            <a:ext cx="887905" cy="369332"/>
           </a:xfrm>
           <a:prstGeom prst="rect">
             <a:avLst/>
@@ -6425,14 +6745,23 @@
           <a:lstStyle/>
           <a:p>
             <a:r>
-              <a:rPr lang="en-GB" sz="2400" dirty="0"/>
-              <a:t>4</a:t>
-            </a:r>
-            <a:r>
-              <a:rPr lang="en-GB" sz="2400" dirty="0" smtClean="0"/>
+              <a:rPr lang="en-GB" dirty="0" smtClean="0">
+                <a:latin typeface="Times New Roman" panose="02020603050405020304" pitchFamily="18" charset="0"/>
+                <a:cs typeface="Times New Roman" panose="02020603050405020304" pitchFamily="18" charset="0"/>
+              </a:rPr>
+              <a:t>Step 4</a:t>
+            </a:r>
+            <a:r>
+              <a:rPr lang="en-GB" dirty="0" smtClean="0">
+                <a:latin typeface="Times New Roman" panose="02020603050405020304" pitchFamily="18" charset="0"/>
+                <a:cs typeface="Times New Roman" panose="02020603050405020304" pitchFamily="18" charset="0"/>
+              </a:rPr>
               <a:t>.</a:t>
             </a:r>
-            <a:endParaRPr lang="en-GB" sz="2400" dirty="0"/>
+            <a:endParaRPr lang="en-GB" dirty="0">
+              <a:latin typeface="Times New Roman" panose="02020603050405020304" pitchFamily="18" charset="0"/>
+              <a:cs typeface="Times New Roman" panose="02020603050405020304" pitchFamily="18" charset="0"/>
+            </a:endParaRPr>
           </a:p>
         </p:txBody>
       </p:sp>
@@ -6444,8 +6773,8 @@
         </p:nvCxnSpPr>
         <p:spPr>
           <a:xfrm>
-            <a:off x="90439" y="1434968"/>
-            <a:ext cx="755576" cy="0"/>
+            <a:off x="110307" y="1181340"/>
+            <a:ext cx="716431" cy="0"/>
           </a:xfrm>
           <a:prstGeom prst="line">
             <a:avLst/>
@@ -6475,8 +6804,8 @@
         </p:nvCxnSpPr>
         <p:spPr>
           <a:xfrm>
-            <a:off x="88263" y="2629943"/>
-            <a:ext cx="755576" cy="0"/>
+            <a:off x="134278" y="2592377"/>
+            <a:ext cx="716431" cy="0"/>
           </a:xfrm>
           <a:prstGeom prst="line">
             <a:avLst/>
@@ -6506,13 +6835,195 @@
         </p:nvCxnSpPr>
         <p:spPr>
           <a:xfrm>
-            <a:off x="88263" y="4520539"/>
-            <a:ext cx="755576" cy="0"/>
+            <a:off x="105953" y="4520952"/>
+            <a:ext cx="716431" cy="0"/>
           </a:xfrm>
           <a:prstGeom prst="line">
             <a:avLst/>
           </a:prstGeom>
           <a:ln w="19050"/>
+        </p:spPr>
+        <p:style>
+          <a:lnRef idx="1">
+            <a:schemeClr val="dk1"/>
+          </a:lnRef>
+          <a:fillRef idx="0">
+            <a:schemeClr val="dk1"/>
+          </a:fillRef>
+          <a:effectRef idx="0">
+            <a:schemeClr val="dk1"/>
+          </a:effectRef>
+          <a:fontRef idx="minor">
+            <a:schemeClr val="tx1"/>
+          </a:fontRef>
+        </p:style>
+      </p:cxnSp>
+      <p:pic>
+        <p:nvPicPr>
+          <p:cNvPr id="1026" name="Picture 2" descr="C:\Users\pms69\AppData\Local\Microsoft\Windows\Temporary Internet Files\Content.IE5\5IZ99ER4\image12_w[1].jpg"/>
+          <p:cNvPicPr>
+            <a:picLocks noChangeAspect="1" noChangeArrowheads="1"/>
+          </p:cNvPicPr>
+          <p:nvPr/>
+        </p:nvPicPr>
+        <p:blipFill>
+          <a:blip r:embed="rId2" cstate="print">
+            <a:extLst>
+              <a:ext uri="{28A0092B-C50C-407E-A947-70E740481C1C}">
+                <a14:useLocalDpi xmlns:a14="http://schemas.microsoft.com/office/drawing/2010/main" val="0"/>
+              </a:ext>
+            </a:extLst>
+          </a:blip>
+          <a:srcRect/>
+          <a:stretch>
+            <a:fillRect/>
+          </a:stretch>
+        </p:blipFill>
+        <p:spPr bwMode="auto">
+          <a:xfrm>
+            <a:off x="944687" y="4808984"/>
+            <a:ext cx="1162992" cy="693434"/>
+          </a:xfrm>
+          <a:prstGeom prst="rect">
+            <a:avLst/>
+          </a:prstGeom>
+          <a:noFill/>
+          <a:extLst>
+            <a:ext uri="{909E8E84-426E-40DD-AFC4-6F175D3DCCD1}">
+              <a14:hiddenFill xmlns:a14="http://schemas.microsoft.com/office/drawing/2010/main">
+                <a:solidFill>
+                  <a:srgbClr val="FFFFFF"/>
+                </a:solidFill>
+              </a14:hiddenFill>
+            </a:ext>
+          </a:extLst>
+        </p:spPr>
+      </p:pic>
+      <p:pic>
+        <p:nvPicPr>
+          <p:cNvPr id="75" name="Picture 2" descr="C:\Users\pms69\AppData\Local\Microsoft\Windows\Temporary Internet Files\Content.IE5\5IZ99ER4\image12_w[1].jpg"/>
+          <p:cNvPicPr>
+            <a:picLocks noChangeAspect="1" noChangeArrowheads="1"/>
+          </p:cNvPicPr>
+          <p:nvPr/>
+        </p:nvPicPr>
+        <p:blipFill>
+          <a:blip r:embed="rId2" cstate="print">
+            <a:extLst>
+              <a:ext uri="{28A0092B-C50C-407E-A947-70E740481C1C}">
+                <a14:useLocalDpi xmlns:a14="http://schemas.microsoft.com/office/drawing/2010/main" val="0"/>
+              </a:ext>
+            </a:extLst>
+          </a:blip>
+          <a:srcRect/>
+          <a:stretch>
+            <a:fillRect/>
+          </a:stretch>
+        </p:blipFill>
+        <p:spPr bwMode="auto">
+          <a:xfrm>
+            <a:off x="3589868" y="4808984"/>
+            <a:ext cx="1162992" cy="693434"/>
+          </a:xfrm>
+          <a:prstGeom prst="rect">
+            <a:avLst/>
+          </a:prstGeom>
+          <a:noFill/>
+          <a:extLst>
+            <a:ext uri="{909E8E84-426E-40DD-AFC4-6F175D3DCCD1}">
+              <a14:hiddenFill xmlns:a14="http://schemas.microsoft.com/office/drawing/2010/main">
+                <a:solidFill>
+                  <a:srgbClr val="FFFFFF"/>
+                </a:solidFill>
+              </a14:hiddenFill>
+            </a:ext>
+          </a:extLst>
+        </p:spPr>
+      </p:pic>
+      <p:cxnSp>
+        <p:nvCxnSpPr>
+          <p:cNvPr id="84" name="Straight Arrow Connector 83"/>
+          <p:cNvCxnSpPr/>
+          <p:nvPr/>
+        </p:nvCxnSpPr>
+        <p:spPr>
+          <a:xfrm>
+            <a:off x="1582962" y="5608572"/>
+            <a:ext cx="457921" cy="522499"/>
+          </a:xfrm>
+          <a:prstGeom prst="straightConnector1">
+            <a:avLst/>
+          </a:prstGeom>
+          <a:ln w="28575">
+            <a:tailEnd type="arrow"/>
+          </a:ln>
+        </p:spPr>
+        <p:style>
+          <a:lnRef idx="1">
+            <a:schemeClr val="dk1"/>
+          </a:lnRef>
+          <a:fillRef idx="0">
+            <a:schemeClr val="dk1"/>
+          </a:fillRef>
+          <a:effectRef idx="0">
+            <a:schemeClr val="dk1"/>
+          </a:effectRef>
+          <a:fontRef idx="minor">
+            <a:schemeClr val="tx1"/>
+          </a:fontRef>
+        </p:style>
+      </p:cxnSp>
+      <p:cxnSp>
+        <p:nvCxnSpPr>
+          <p:cNvPr id="88" name="Straight Arrow Connector 87"/>
+          <p:cNvCxnSpPr/>
+          <p:nvPr/>
+        </p:nvCxnSpPr>
+        <p:spPr>
+          <a:xfrm flipH="1">
+            <a:off x="3772348" y="5654636"/>
+            <a:ext cx="399016" cy="476435"/>
+          </a:xfrm>
+          <a:prstGeom prst="straightConnector1">
+            <a:avLst/>
+          </a:prstGeom>
+          <a:ln w="28575">
+            <a:tailEnd type="arrow"/>
+          </a:ln>
+        </p:spPr>
+        <p:style>
+          <a:lnRef idx="1">
+            <a:schemeClr val="dk1"/>
+          </a:lnRef>
+          <a:fillRef idx="0">
+            <a:schemeClr val="dk1"/>
+          </a:fillRef>
+          <a:effectRef idx="0">
+            <a:schemeClr val="dk1"/>
+          </a:effectRef>
+          <a:fontRef idx="minor">
+            <a:schemeClr val="tx1"/>
+          </a:fontRef>
+        </p:style>
+      </p:cxnSp>
+      <p:cxnSp>
+        <p:nvCxnSpPr>
+          <p:cNvPr id="89" name="Straight Arrow Connector 88"/>
+          <p:cNvCxnSpPr/>
+          <p:nvPr/>
+        </p:nvCxnSpPr>
+        <p:spPr>
+          <a:xfrm>
+            <a:off x="2885712" y="5502418"/>
+            <a:ext cx="0" cy="674718"/>
+          </a:xfrm>
+          <a:prstGeom prst="straightConnector1">
+            <a:avLst/>
+          </a:prstGeom>
+          <a:ln w="28575">
+            <a:prstDash val="sysDot"/>
+            <a:tailEnd type="arrow"/>
+          </a:ln>
         </p:spPr>
         <p:style>
           <a:lnRef idx="1">

</xml_diff>